<commit_message>
Dave's deel van de PowerPoint
</commit_message>
<xml_diff>
--- a/Spring Boot.pptx
+++ b/Spring Boot.pptx
@@ -1,32 +1,40 @@
 
 <file path=ppt/presentation.xml><?xml version="1.0" encoding="utf-8"?>
-<p:presentation xmlns:a="http://schemas.openxmlformats.org/drawingml/2006/main" xmlns:r="http://schemas.openxmlformats.org/officeDocument/2006/relationships" xmlns:p="http://schemas.openxmlformats.org/presentationml/2006/main" saveSubsetFonts="1">
+<p:presentation xmlns:a="http://schemas.openxmlformats.org/drawingml/2006/main" xmlns:r="http://schemas.openxmlformats.org/officeDocument/2006/relationships" xmlns:p="http://schemas.openxmlformats.org/presentationml/2006/main">
   <p:sldMasterIdLst>
     <p:sldMasterId id="2147483648" r:id="rId1"/>
   </p:sldMasterIdLst>
   <p:notesMasterIdLst>
-    <p:notesMasterId r:id="rId12"/>
+    <p:notesMasterId r:id="rId24"/>
   </p:notesMasterIdLst>
   <p:handoutMasterIdLst>
-    <p:handoutMasterId r:id="rId13"/>
+    <p:handoutMasterId r:id="rId25"/>
   </p:handoutMasterIdLst>
   <p:sldIdLst>
-    <p:sldId id="256" r:id="rId2"/>
-    <p:sldId id="260" r:id="rId3"/>
-    <p:sldId id="259" r:id="rId4"/>
-    <p:sldId id="261" r:id="rId5"/>
-    <p:sldId id="262" r:id="rId6"/>
-    <p:sldId id="263" r:id="rId7"/>
-    <p:sldId id="264" r:id="rId8"/>
-    <p:sldId id="265" r:id="rId9"/>
-    <p:sldId id="266" r:id="rId10"/>
-    <p:sldId id="267" r:id="rId11"/>
+    <p:sldId id="256" r:id="rId3"/>
+    <p:sldId id="260" r:id="rId4"/>
+    <p:sldId id="259" r:id="rId5"/>
+    <p:sldId id="261" r:id="rId6"/>
+    <p:sldId id="262" r:id="rId7"/>
+    <p:sldId id="263" r:id="rId8"/>
+    <p:sldId id="264" r:id="rId9"/>
+    <p:sldId id="265" r:id="rId10"/>
+    <p:sldId id="266" r:id="rId11"/>
+    <p:sldId id="267" r:id="rId12"/>
+    <p:sldId id="269" r:id="rId13"/>
+    <p:sldId id="270" r:id="rId14"/>
+    <p:sldId id="271" r:id="rId15"/>
+    <p:sldId id="272" r:id="rId16"/>
+    <p:sldId id="273" r:id="rId17"/>
+    <p:sldId id="274" r:id="rId18"/>
+    <p:sldId id="275" r:id="rId19"/>
+    <p:sldId id="276" r:id="rId20"/>
+    <p:sldId id="277" r:id="rId21"/>
+    <p:sldId id="278" r:id="rId22"/>
+    <p:sldId id="279" r:id="rId23"/>
   </p:sldIdLst>
   <p:sldSz cx="9144000" cy="6858000" type="screen4x3"/>
   <p:notesSz cx="6858000" cy="9144000"/>
-  <p:custDataLst>
-    <p:tags r:id="rId14"/>
-  </p:custDataLst>
   <p:defaultTextStyle>
     <a:defPPr>
       <a:defRPr lang="nl-NL"/>
@@ -152,36 +160,6 @@
       </a:defRPr>
     </a:lvl9pPr>
   </p:defaultTextStyle>
-  <p:extLst>
-    <p:ext uri="{EFAFB233-063F-42B5-8137-9DF3F51BA10A}">
-      <p15:sldGuideLst xmlns:p15="http://schemas.microsoft.com/office/powerpoint/2012/main">
-        <p15:guide id="1" orient="horz" pos="2160">
-          <p15:clr>
-            <a:srgbClr val="A4A3A4"/>
-          </p15:clr>
-        </p15:guide>
-        <p15:guide id="2" pos="2880">
-          <p15:clr>
-            <a:srgbClr val="A4A3A4"/>
-          </p15:clr>
-        </p15:guide>
-      </p15:sldGuideLst>
-    </p:ext>
-    <p:ext uri="{2D200454-40CA-4A62-9FC3-DE9A4176ACB9}">
-      <p15:notesGuideLst xmlns:p15="http://schemas.microsoft.com/office/powerpoint/2012/main">
-        <p15:guide id="1" orient="horz" pos="2880">
-          <p15:clr>
-            <a:srgbClr val="A4A3A4"/>
-          </p15:clr>
-        </p15:guide>
-        <p15:guide id="2" pos="2160">
-          <p15:clr>
-            <a:srgbClr val="A4A3A4"/>
-          </p15:clr>
-        </p15:guide>
-      </p15:notesGuideLst>
-    </p:ext>
-  </p:extLst>
 </p:presentation>
 </file>
 
@@ -263,11 +241,7 @@
           </a:extLst>
         </p:spPr>
         <p:txBody>
-          <a:bodyPr vert="horz" wrap="square" lIns="0" tIns="0" rIns="0" bIns="0" numCol="1" anchor="t" anchorCtr="0" compatLnSpc="1">
-            <a:prstTxWarp prst="textNoShape">
-              <a:avLst/>
-            </a:prstTxWarp>
-          </a:bodyPr>
+          <a:bodyPr vert="horz" wrap="square" lIns="0" tIns="0" rIns="0" bIns="0" numCol="1" anchor="t" anchorCtr="0" compatLnSpc="1"/>
           <a:lstStyle>
             <a:lvl1pPr>
               <a:defRPr sz="1000"/>
@@ -331,11 +305,7 @@
           </a:extLst>
         </p:spPr>
         <p:txBody>
-          <a:bodyPr vert="horz" wrap="square" lIns="0" tIns="0" rIns="0" bIns="0" numCol="1" anchor="t" anchorCtr="0" compatLnSpc="1">
-            <a:prstTxWarp prst="textNoShape">
-              <a:avLst/>
-            </a:prstTxWarp>
-          </a:bodyPr>
+          <a:bodyPr vert="horz" wrap="square" lIns="0" tIns="0" rIns="0" bIns="0" numCol="1" anchor="t" anchorCtr="0" compatLnSpc="1"/>
           <a:lstStyle>
             <a:lvl1pPr>
               <a:defRPr sz="1100">
@@ -405,11 +375,7 @@
           </a:extLst>
         </p:spPr>
         <p:txBody>
-          <a:bodyPr vert="horz" wrap="square" lIns="0" tIns="0" rIns="0" bIns="0" numCol="1" anchor="t" anchorCtr="0" compatLnSpc="1">
-            <a:prstTxWarp prst="textNoShape">
-              <a:avLst/>
-            </a:prstTxWarp>
-          </a:bodyPr>
+          <a:bodyPr vert="horz" wrap="square" lIns="0" tIns="0" rIns="0" bIns="0" numCol="1" anchor="t" anchorCtr="0" compatLnSpc="1"/>
           <a:lstStyle>
             <a:lvl1pPr>
               <a:defRPr sz="1100">
@@ -479,11 +445,7 @@
           </a:extLst>
         </p:spPr>
         <p:txBody>
-          <a:bodyPr vert="horz" wrap="square" lIns="0" tIns="0" rIns="0" bIns="0" numCol="1" anchor="t" anchorCtr="0" compatLnSpc="1">
-            <a:prstTxWarp prst="textNoShape">
-              <a:avLst/>
-            </a:prstTxWarp>
-          </a:bodyPr>
+          <a:bodyPr vert="horz" wrap="square" lIns="0" tIns="0" rIns="0" bIns="0" numCol="1" anchor="t" anchorCtr="0" compatLnSpc="1"/>
           <a:lstStyle>
             <a:lvl1pPr algn="r">
               <a:defRPr sz="1100">
@@ -494,8 +456,6 @@
           <a:p>
             <a:fld id="{BB1C8681-22B9-4900-BB9E-403373184B6B}" type="slidenum">
               <a:rPr lang="nl-NL"/>
-              <a:pPr/>
-              <a:t>‹nr.›</a:t>
             </a:fld>
             <a:endParaRPr lang="nl-NL"/>
           </a:p>
@@ -564,6 +524,7 @@
               <a:rPr lang="nl-NL" sz="800"/>
               <a:t>Titel</a:t>
             </a:r>
+            <a:endParaRPr lang="nl-NL" sz="800"/>
           </a:p>
         </p:txBody>
       </p:sp>
@@ -630,15 +591,11 @@
               <a:rPr lang="nl-NL" sz="800"/>
               <a:t>Datum</a:t>
             </a:r>
+            <a:endParaRPr lang="nl-NL" sz="800"/>
           </a:p>
         </p:txBody>
       </p:sp>
     </p:spTree>
-    <p:extLst>
-      <p:ext uri="{BB962C8B-B14F-4D97-AF65-F5344CB8AC3E}">
-        <p14:creationId xmlns:p14="http://schemas.microsoft.com/office/powerpoint/2010/main" val="2105443211"/>
-      </p:ext>
-    </p:extLst>
   </p:cSld>
   <p:clrMap bg1="lt1" tx1="dk1" bg2="lt2" tx2="dk2" accent1="accent1" accent2="accent2" accent3="accent3" accent4="accent4" accent5="accent5" accent6="accent6" hlink="hlink" folHlink="folHlink"/>
   <p:hf/>
@@ -694,8 +651,6 @@
               <a:srgbClr val="000000"/>
             </a:solidFill>
             <a:miter lim="800000"/>
-            <a:headEnd/>
-            <a:tailEnd/>
           </a:ln>
           <a:effectLst/>
           <a:extLst>
@@ -707,9 +662,6 @@
                   </a:outerShdw>
                 </a:effectLst>
               </a14:hiddenEffects>
-            </a:ext>
-            <a:ext uri="{53640926-AAD7-44D8-BBD7-CCE9431645EC}">
-              <a14:shadowObscured xmlns:a14="http://schemas.microsoft.com/office/drawing/2010/main" val="1"/>
             </a:ext>
           </a:extLst>
         </p:spPr>
@@ -767,11 +719,7 @@
           </a:extLst>
         </p:spPr>
         <p:txBody>
-          <a:bodyPr vert="horz" wrap="square" lIns="0" tIns="0" rIns="0" bIns="0" numCol="1" anchor="t" anchorCtr="0" compatLnSpc="1">
-            <a:prstTxWarp prst="textNoShape">
-              <a:avLst/>
-            </a:prstTxWarp>
-          </a:bodyPr>
+          <a:bodyPr vert="horz" wrap="square" lIns="0" tIns="0" rIns="0" bIns="0" numCol="1" anchor="t" anchorCtr="0" compatLnSpc="1"/>
           <a:lstStyle/>
           <a:p>
             <a:pPr lvl="0"/>
@@ -779,6 +727,7 @@
               <a:rPr lang="nl-NL" smtClean="0"/>
               <a:t>Click to edit Master text styles</a:t>
             </a:r>
+            <a:endParaRPr lang="nl-NL" smtClean="0"/>
           </a:p>
           <a:p>
             <a:pPr lvl="1"/>
@@ -786,6 +735,7 @@
               <a:rPr lang="nl-NL" smtClean="0"/>
               <a:t>Second level</a:t>
             </a:r>
+            <a:endParaRPr lang="nl-NL" smtClean="0"/>
           </a:p>
           <a:p>
             <a:pPr lvl="2"/>
@@ -793,6 +743,7 @@
               <a:rPr lang="nl-NL" smtClean="0"/>
               <a:t>Third level</a:t>
             </a:r>
+            <a:endParaRPr lang="nl-NL" smtClean="0"/>
           </a:p>
           <a:p>
             <a:pPr lvl="3"/>
@@ -800,6 +751,7 @@
               <a:rPr lang="nl-NL" smtClean="0"/>
               <a:t>Fourth level</a:t>
             </a:r>
+            <a:endParaRPr lang="nl-NL" smtClean="0"/>
           </a:p>
           <a:p>
             <a:pPr lvl="4"/>
@@ -807,6 +759,7 @@
               <a:rPr lang="nl-NL" smtClean="0"/>
               <a:t>Fifth level</a:t>
             </a:r>
+            <a:endParaRPr lang="nl-NL" smtClean="0"/>
           </a:p>
         </p:txBody>
       </p:sp>
@@ -863,11 +816,7 @@
           </a:extLst>
         </p:spPr>
         <p:txBody>
-          <a:bodyPr vert="horz" wrap="square" lIns="0" tIns="0" rIns="0" bIns="0" numCol="1" anchor="t" anchorCtr="0" compatLnSpc="1">
-            <a:prstTxWarp prst="textNoShape">
-              <a:avLst/>
-            </a:prstTxWarp>
-          </a:bodyPr>
+          <a:bodyPr vert="horz" wrap="square" lIns="0" tIns="0" rIns="0" bIns="0" numCol="1" anchor="t" anchorCtr="0" compatLnSpc="1"/>
           <a:lstStyle>
             <a:lvl1pPr>
               <a:defRPr sz="1000"/>
@@ -931,11 +880,7 @@
           </a:extLst>
         </p:spPr>
         <p:txBody>
-          <a:bodyPr vert="horz" wrap="square" lIns="0" tIns="0" rIns="0" bIns="0" numCol="1" anchor="t" anchorCtr="0" compatLnSpc="1">
-            <a:prstTxWarp prst="textNoShape">
-              <a:avLst/>
-            </a:prstTxWarp>
-          </a:bodyPr>
+          <a:bodyPr vert="horz" wrap="square" lIns="0" tIns="0" rIns="0" bIns="0" numCol="1" anchor="t" anchorCtr="0" compatLnSpc="1"/>
           <a:lstStyle>
             <a:lvl1pPr>
               <a:defRPr sz="1100">
@@ -1005,11 +950,7 @@
           </a:extLst>
         </p:spPr>
         <p:txBody>
-          <a:bodyPr vert="horz" wrap="square" lIns="0" tIns="0" rIns="0" bIns="0" numCol="1" anchor="t" anchorCtr="0" compatLnSpc="1">
-            <a:prstTxWarp prst="textNoShape">
-              <a:avLst/>
-            </a:prstTxWarp>
-          </a:bodyPr>
+          <a:bodyPr vert="horz" wrap="square" lIns="0" tIns="0" rIns="0" bIns="0" numCol="1" anchor="t" anchorCtr="0" compatLnSpc="1"/>
           <a:lstStyle>
             <a:lvl1pPr>
               <a:defRPr sz="1100">
@@ -1079,11 +1020,7 @@
           </a:extLst>
         </p:spPr>
         <p:txBody>
-          <a:bodyPr vert="horz" wrap="square" lIns="0" tIns="0" rIns="0" bIns="0" numCol="1" anchor="t" anchorCtr="0" compatLnSpc="1">
-            <a:prstTxWarp prst="textNoShape">
-              <a:avLst/>
-            </a:prstTxWarp>
-          </a:bodyPr>
+          <a:bodyPr vert="horz" wrap="square" lIns="0" tIns="0" rIns="0" bIns="0" numCol="1" anchor="t" anchorCtr="0" compatLnSpc="1"/>
           <a:lstStyle>
             <a:lvl1pPr algn="r">
               <a:defRPr sz="1100">
@@ -1094,8 +1031,6 @@
           <a:p>
             <a:fld id="{CAA5F649-BDE7-4A71-AE77-FDA66D29DD37}" type="slidenum">
               <a:rPr lang="nl-NL"/>
-              <a:pPr/>
-              <a:t>‹nr.›</a:t>
             </a:fld>
             <a:endParaRPr lang="nl-NL"/>
           </a:p>
@@ -1164,6 +1099,7 @@
               <a:rPr lang="nl-NL" sz="800"/>
               <a:t>Titel</a:t>
             </a:r>
+            <a:endParaRPr lang="nl-NL" sz="800"/>
           </a:p>
         </p:txBody>
       </p:sp>
@@ -1230,20 +1166,16 @@
               <a:rPr lang="nl-NL" sz="800"/>
               <a:t>Datum</a:t>
             </a:r>
+            <a:endParaRPr lang="nl-NL" sz="800"/>
           </a:p>
         </p:txBody>
       </p:sp>
     </p:spTree>
-    <p:extLst>
-      <p:ext uri="{BB962C8B-B14F-4D97-AF65-F5344CB8AC3E}">
-        <p14:creationId xmlns:p14="http://schemas.microsoft.com/office/powerpoint/2010/main" val="1077576400"/>
-      </p:ext>
-    </p:extLst>
   </p:cSld>
   <p:clrMap bg1="lt1" tx1="dk1" bg2="lt2" tx2="dk2" accent1="accent1" accent2="accent2" accent3="accent3" accent4="accent4" accent5="accent5" accent6="accent6" hlink="hlink" folHlink="folHlink"/>
   <p:hf/>
   <p:notesStyle>
-    <a:lvl1pPr marL="179388" indent="-179388" algn="l" rtl="0" fontAlgn="base">
+    <a:lvl1pPr marL="179705" indent="-179705" algn="l" rtl="0" fontAlgn="base">
       <a:spcBef>
         <a:spcPct val="30000"/>
       </a:spcBef>
@@ -1259,7 +1191,7 @@
         <a:cs typeface="+mn-cs"/>
       </a:defRPr>
     </a:lvl1pPr>
-    <a:lvl2pPr marL="360363" indent="-180975" algn="l" rtl="0" fontAlgn="base">
+    <a:lvl2pPr marL="360680" indent="-180975" algn="l" rtl="0" fontAlgn="base">
       <a:spcBef>
         <a:spcPct val="30000"/>
       </a:spcBef>
@@ -1275,7 +1207,7 @@
         <a:cs typeface="+mn-cs"/>
       </a:defRPr>
     </a:lvl2pPr>
-    <a:lvl3pPr marL="539750" indent="-179388" algn="l" rtl="0" fontAlgn="base">
+    <a:lvl3pPr marL="539750" indent="-179705" algn="l" rtl="0" fontAlgn="base">
       <a:spcBef>
         <a:spcPct val="30000"/>
       </a:spcBef>
@@ -1307,7 +1239,7 @@
         <a:cs typeface="+mn-cs"/>
       </a:defRPr>
     </a:lvl4pPr>
-    <a:lvl5pPr marL="900113" indent="-179388" algn="l" rtl="0" fontAlgn="base">
+    <a:lvl5pPr marL="900430" indent="-179705" algn="l" rtl="0" fontAlgn="base">
       <a:spcBef>
         <a:spcPct val="30000"/>
       </a:spcBef>
@@ -1368,7 +1300,7 @@
 </file>
 
 <file path=ppt/slideLayouts/slideLayout1.xml><?xml version="1.0" encoding="utf-8"?>
-<p:sldLayout xmlns:a="http://schemas.openxmlformats.org/drawingml/2006/main" xmlns:r="http://schemas.openxmlformats.org/officeDocument/2006/relationships" xmlns:p="http://schemas.openxmlformats.org/presentationml/2006/main" showMasterSp="0" type="title" preserve="1">
+<p:sldLayout xmlns:a="http://schemas.openxmlformats.org/drawingml/2006/main" xmlns:r="http://schemas.openxmlformats.org/officeDocument/2006/relationships" xmlns:p="http://schemas.openxmlformats.org/presentationml/2006/main" type="title" preserve="1" showMasterSp="0">
   <p:cSld name="Titeldia">
     <p:spTree>
       <p:nvGrpSpPr>
@@ -1550,7 +1482,7 @@
             <a:spLocks noGrp="1" noChangeArrowheads="1"/>
           </p:cNvSpPr>
           <p:nvPr>
-            <p:ph type="ctrTitle"/>
+            <p:ph type="ctrTitle" hasCustomPrompt="1"/>
           </p:nvPr>
         </p:nvSpPr>
         <p:spPr>
@@ -1572,6 +1504,7 @@
               <a:rPr lang="nl-NL" noProof="0" smtClean="0"/>
               <a:t>Klik om de stijl te bewerken</a:t>
             </a:r>
+            <a:endParaRPr lang="nl-NL" noProof="0" smtClean="0"/>
           </a:p>
         </p:txBody>
       </p:sp>
@@ -1582,7 +1515,7 @@
             <a:spLocks noGrp="1" noChangeArrowheads="1"/>
           </p:cNvSpPr>
           <p:nvPr>
-            <p:ph type="subTitle" idx="1"/>
+            <p:ph type="subTitle" idx="1" hasCustomPrompt="1"/>
           </p:nvPr>
         </p:nvSpPr>
         <p:spPr>
@@ -1606,6 +1539,7 @@
               <a:rPr lang="nl-NL" noProof="0" smtClean="0"/>
               <a:t>Klik om de ondertitelstijl van het model te bewerken</a:t>
             </a:r>
+            <a:endParaRPr lang="nl-NL" noProof="0" smtClean="0"/>
           </a:p>
         </p:txBody>
       </p:sp>
@@ -1666,8 +1600,6 @@
           <a:p>
             <a:fld id="{E5470B6A-C6FC-4660-AC7F-F18C1CF98F7C}" type="slidenum">
               <a:rPr lang="nl-NL"/>
-              <a:pPr/>
-              <a:t>‹nr.›</a:t>
             </a:fld>
             <a:endParaRPr lang="nl-NL"/>
           </a:p>
@@ -1869,7 +1801,7 @@
             <a:spLocks noGrp="1"/>
           </p:cNvSpPr>
           <p:nvPr>
-            <p:ph type="title"/>
+            <p:ph type="title" hasCustomPrompt="1"/>
           </p:nvPr>
         </p:nvSpPr>
         <p:spPr/>
@@ -1892,7 +1824,7 @@
             <a:spLocks noGrp="1"/>
           </p:cNvSpPr>
           <p:nvPr>
-            <p:ph idx="1"/>
+            <p:ph idx="1" hasCustomPrompt="1"/>
           </p:nvPr>
         </p:nvSpPr>
         <p:spPr/>
@@ -1905,6 +1837,7 @@
               <a:rPr lang="nl-NL" smtClean="0"/>
               <a:t>Klik om de modelstijlen te bewerken</a:t>
             </a:r>
+            <a:endParaRPr lang="nl-NL" smtClean="0"/>
           </a:p>
           <a:p>
             <a:pPr lvl="1"/>
@@ -1912,6 +1845,7 @@
               <a:rPr lang="nl-NL" smtClean="0"/>
               <a:t>Tweede niveau</a:t>
             </a:r>
+            <a:endParaRPr lang="nl-NL" smtClean="0"/>
           </a:p>
           <a:p>
             <a:pPr lvl="2"/>
@@ -1919,6 +1853,7 @@
               <a:rPr lang="nl-NL" smtClean="0"/>
               <a:t>Derde niveau</a:t>
             </a:r>
+            <a:endParaRPr lang="nl-NL" smtClean="0"/>
           </a:p>
           <a:p>
             <a:pPr lvl="3"/>
@@ -1926,6 +1861,7 @@
               <a:rPr lang="nl-NL" smtClean="0"/>
               <a:t>Vierde niveau</a:t>
             </a:r>
+            <a:endParaRPr lang="nl-NL" smtClean="0"/>
           </a:p>
           <a:p>
             <a:pPr lvl="4"/>
@@ -2012,19 +1948,12 @@
           <a:p>
             <a:fld id="{204CA5A0-4B1D-4A14-8811-788AE825D559}" type="slidenum">
               <a:rPr lang="nl-NL"/>
-              <a:pPr/>
-              <a:t>‹nr.›</a:t>
             </a:fld>
             <a:endParaRPr lang="nl-NL"/>
           </a:p>
         </p:txBody>
       </p:sp>
     </p:spTree>
-    <p:extLst>
-      <p:ext uri="{BB962C8B-B14F-4D97-AF65-F5344CB8AC3E}">
-        <p14:creationId xmlns:p14="http://schemas.microsoft.com/office/powerpoint/2010/main" val="3912029962"/>
-      </p:ext>
-    </p:extLst>
   </p:cSld>
   <p:clrMapOvr>
     <a:masterClrMapping/>
@@ -2056,7 +1985,7 @@
             <a:spLocks noGrp="1"/>
           </p:cNvSpPr>
           <p:nvPr>
-            <p:ph type="title"/>
+            <p:ph type="title" hasCustomPrompt="1"/>
           </p:nvPr>
         </p:nvSpPr>
         <p:spPr/>
@@ -2079,7 +2008,7 @@
             <a:spLocks noGrp="1"/>
           </p:cNvSpPr>
           <p:nvPr>
-            <p:ph sz="half" idx="1"/>
+            <p:ph sz="half" idx="1" hasCustomPrompt="1"/>
           </p:nvPr>
         </p:nvSpPr>
         <p:spPr>
@@ -2097,6 +2026,7 @@
               <a:rPr lang="nl-NL" smtClean="0"/>
               <a:t>Klik om de modelstijlen te bewerken</a:t>
             </a:r>
+            <a:endParaRPr lang="nl-NL" smtClean="0"/>
           </a:p>
           <a:p>
             <a:pPr lvl="1"/>
@@ -2104,6 +2034,7 @@
               <a:rPr lang="nl-NL" smtClean="0"/>
               <a:t>Tweede niveau</a:t>
             </a:r>
+            <a:endParaRPr lang="nl-NL" smtClean="0"/>
           </a:p>
           <a:p>
             <a:pPr lvl="2"/>
@@ -2111,6 +2042,7 @@
               <a:rPr lang="nl-NL" smtClean="0"/>
               <a:t>Derde niveau</a:t>
             </a:r>
+            <a:endParaRPr lang="nl-NL" smtClean="0"/>
           </a:p>
           <a:p>
             <a:pPr lvl="3"/>
@@ -2118,6 +2050,7 @@
               <a:rPr lang="nl-NL" smtClean="0"/>
               <a:t>Vierde niveau</a:t>
             </a:r>
+            <a:endParaRPr lang="nl-NL" smtClean="0"/>
           </a:p>
           <a:p>
             <a:pPr lvl="4"/>
@@ -2136,7 +2069,7 @@
             <a:spLocks noGrp="1"/>
           </p:cNvSpPr>
           <p:nvPr>
-            <p:ph sz="half" idx="2"/>
+            <p:ph sz="half" idx="2" hasCustomPrompt="1"/>
           </p:nvPr>
         </p:nvSpPr>
         <p:spPr>
@@ -2154,6 +2087,7 @@
               <a:rPr lang="nl-NL" smtClean="0"/>
               <a:t>Klik om de modelstijlen te bewerken</a:t>
             </a:r>
+            <a:endParaRPr lang="nl-NL" smtClean="0"/>
           </a:p>
           <a:p>
             <a:pPr lvl="1"/>
@@ -2161,6 +2095,7 @@
               <a:rPr lang="nl-NL" smtClean="0"/>
               <a:t>Tweede niveau</a:t>
             </a:r>
+            <a:endParaRPr lang="nl-NL" smtClean="0"/>
           </a:p>
           <a:p>
             <a:pPr lvl="2"/>
@@ -2168,6 +2103,7 @@
               <a:rPr lang="nl-NL" smtClean="0"/>
               <a:t>Derde niveau</a:t>
             </a:r>
+            <a:endParaRPr lang="nl-NL" smtClean="0"/>
           </a:p>
           <a:p>
             <a:pPr lvl="3"/>
@@ -2175,6 +2111,7 @@
               <a:rPr lang="nl-NL" smtClean="0"/>
               <a:t>Vierde niveau</a:t>
             </a:r>
+            <a:endParaRPr lang="nl-NL" smtClean="0"/>
           </a:p>
           <a:p>
             <a:pPr lvl="4"/>
@@ -2261,19 +2198,12 @@
           <a:p>
             <a:fld id="{88ED7BD2-2969-4CBD-8DB1-AFD361988617}" type="slidenum">
               <a:rPr lang="nl-NL"/>
-              <a:pPr/>
-              <a:t>‹nr.›</a:t>
             </a:fld>
             <a:endParaRPr lang="nl-NL"/>
           </a:p>
         </p:txBody>
       </p:sp>
     </p:spTree>
-    <p:extLst>
-      <p:ext uri="{BB962C8B-B14F-4D97-AF65-F5344CB8AC3E}">
-        <p14:creationId xmlns:p14="http://schemas.microsoft.com/office/powerpoint/2010/main" val="2988911186"/>
-      </p:ext>
-    </p:extLst>
   </p:cSld>
   <p:clrMapOvr>
     <a:masterClrMapping/>
@@ -2312,7 +2242,7 @@
             <a:spLocks noGrp="1"/>
           </p:cNvSpPr>
           <p:nvPr>
-            <p:ph type="body" idx="1"/>
+            <p:ph type="body" idx="1" hasCustomPrompt="1"/>
           </p:nvPr>
         </p:nvSpPr>
         <p:spPr>
@@ -2369,6 +2299,7 @@
               <a:rPr lang="nl-NL" smtClean="0"/>
               <a:t>Klik om de modelstijlen te bewerken</a:t>
             </a:r>
+            <a:endParaRPr lang="nl-NL" smtClean="0"/>
           </a:p>
         </p:txBody>
       </p:sp>
@@ -2379,7 +2310,7 @@
             <a:spLocks noGrp="1"/>
           </p:cNvSpPr>
           <p:nvPr>
-            <p:ph type="body" sz="quarter" idx="3"/>
+            <p:ph type="body" sz="quarter" idx="3" hasCustomPrompt="1"/>
           </p:nvPr>
         </p:nvSpPr>
         <p:spPr>
@@ -2436,6 +2367,7 @@
               <a:rPr lang="nl-NL" smtClean="0"/>
               <a:t>Klik om de modelstijlen te bewerken</a:t>
             </a:r>
+            <a:endParaRPr lang="nl-NL" smtClean="0"/>
           </a:p>
         </p:txBody>
       </p:sp>
@@ -2514,8 +2446,6 @@
           <a:p>
             <a:fld id="{510FD4BD-C0E1-478E-AE19-8BE19D545F73}" type="slidenum">
               <a:rPr lang="nl-NL"/>
-              <a:pPr/>
-              <a:t>‹nr.›</a:t>
             </a:fld>
             <a:endParaRPr lang="nl-NL"/>
           </a:p>
@@ -2528,7 +2458,7 @@
             <a:spLocks noGrp="1"/>
           </p:cNvSpPr>
           <p:nvPr>
-            <p:ph type="title"/>
+            <p:ph type="title" hasCustomPrompt="1"/>
           </p:nvPr>
         </p:nvSpPr>
         <p:spPr/>
@@ -2551,7 +2481,7 @@
             <a:spLocks noGrp="1"/>
           </p:cNvSpPr>
           <p:nvPr>
-            <p:ph sz="half" idx="13"/>
+            <p:ph sz="half" idx="13" hasCustomPrompt="1"/>
           </p:nvPr>
         </p:nvSpPr>
         <p:spPr>
@@ -2569,6 +2499,7 @@
               <a:rPr lang="nl-NL" smtClean="0"/>
               <a:t>Klik om de modelstijlen te bewerken</a:t>
             </a:r>
+            <a:endParaRPr lang="nl-NL" smtClean="0"/>
           </a:p>
           <a:p>
             <a:pPr lvl="1"/>
@@ -2576,6 +2507,7 @@
               <a:rPr lang="nl-NL" smtClean="0"/>
               <a:t>Tweede niveau</a:t>
             </a:r>
+            <a:endParaRPr lang="nl-NL" smtClean="0"/>
           </a:p>
           <a:p>
             <a:pPr lvl="2"/>
@@ -2583,6 +2515,7 @@
               <a:rPr lang="nl-NL" smtClean="0"/>
               <a:t>Derde niveau</a:t>
             </a:r>
+            <a:endParaRPr lang="nl-NL" smtClean="0"/>
           </a:p>
           <a:p>
             <a:pPr lvl="3"/>
@@ -2590,6 +2523,7 @@
               <a:rPr lang="nl-NL" smtClean="0"/>
               <a:t>Vierde niveau</a:t>
             </a:r>
+            <a:endParaRPr lang="nl-NL" smtClean="0"/>
           </a:p>
           <a:p>
             <a:pPr lvl="4"/>
@@ -2608,7 +2542,7 @@
             <a:spLocks noGrp="1"/>
           </p:cNvSpPr>
           <p:nvPr>
-            <p:ph sz="half" idx="2"/>
+            <p:ph sz="half" idx="2" hasCustomPrompt="1"/>
           </p:nvPr>
         </p:nvSpPr>
         <p:spPr>
@@ -2626,6 +2560,7 @@
               <a:rPr lang="nl-NL" smtClean="0"/>
               <a:t>Klik om de modelstijlen te bewerken</a:t>
             </a:r>
+            <a:endParaRPr lang="nl-NL" smtClean="0"/>
           </a:p>
           <a:p>
             <a:pPr lvl="1"/>
@@ -2633,6 +2568,7 @@
               <a:rPr lang="nl-NL" smtClean="0"/>
               <a:t>Tweede niveau</a:t>
             </a:r>
+            <a:endParaRPr lang="nl-NL" smtClean="0"/>
           </a:p>
           <a:p>
             <a:pPr lvl="2"/>
@@ -2640,6 +2576,7 @@
               <a:rPr lang="nl-NL" smtClean="0"/>
               <a:t>Derde niveau</a:t>
             </a:r>
+            <a:endParaRPr lang="nl-NL" smtClean="0"/>
           </a:p>
           <a:p>
             <a:pPr lvl="3"/>
@@ -2647,6 +2584,7 @@
               <a:rPr lang="nl-NL" smtClean="0"/>
               <a:t>Vierde niveau</a:t>
             </a:r>
+            <a:endParaRPr lang="nl-NL" smtClean="0"/>
           </a:p>
           <a:p>
             <a:pPr lvl="4"/>
@@ -2659,11 +2597,6 @@
         </p:txBody>
       </p:sp>
     </p:spTree>
-    <p:extLst>
-      <p:ext uri="{BB962C8B-B14F-4D97-AF65-F5344CB8AC3E}">
-        <p14:creationId xmlns:p14="http://schemas.microsoft.com/office/powerpoint/2010/main" val="2598208539"/>
-      </p:ext>
-    </p:extLst>
   </p:cSld>
   <p:clrMapOvr>
     <a:masterClrMapping/>
@@ -2702,7 +2635,7 @@
             <a:spLocks noGrp="1"/>
           </p:cNvSpPr>
           <p:nvPr>
-            <p:ph type="title"/>
+            <p:ph type="title" hasCustomPrompt="1"/>
           </p:nvPr>
         </p:nvSpPr>
         <p:spPr/>
@@ -2793,19 +2726,12 @@
           <a:p>
             <a:fld id="{A506F0F0-378F-4762-B7D9-C580A6F91655}" type="slidenum">
               <a:rPr lang="nl-NL"/>
-              <a:pPr/>
-              <a:t>‹nr.›</a:t>
             </a:fld>
             <a:endParaRPr lang="nl-NL"/>
           </a:p>
         </p:txBody>
       </p:sp>
     </p:spTree>
-    <p:extLst>
-      <p:ext uri="{BB962C8B-B14F-4D97-AF65-F5344CB8AC3E}">
-        <p14:creationId xmlns:p14="http://schemas.microsoft.com/office/powerpoint/2010/main" val="2534872283"/>
-      </p:ext>
-    </p:extLst>
   </p:cSld>
   <p:clrMapOvr>
     <a:masterClrMapping/>
@@ -2905,19 +2831,12 @@
           <a:p>
             <a:fld id="{7D42650C-8C65-4F3F-AFCB-9DFD34A689A0}" type="slidenum">
               <a:rPr lang="nl-NL"/>
-              <a:pPr/>
-              <a:t>‹nr.›</a:t>
             </a:fld>
             <a:endParaRPr lang="nl-NL"/>
           </a:p>
         </p:txBody>
       </p:sp>
     </p:spTree>
-    <p:extLst>
-      <p:ext uri="{BB962C8B-B14F-4D97-AF65-F5344CB8AC3E}">
-        <p14:creationId xmlns:p14="http://schemas.microsoft.com/office/powerpoint/2010/main" val="1981244128"/>
-      </p:ext>
-    </p:extLst>
   </p:cSld>
   <p:clrMapOvr>
     <a:masterClrMapping/>
@@ -3003,11 +2922,7 @@
           </a:extLst>
         </p:spPr>
         <p:txBody>
-          <a:bodyPr vert="horz" wrap="square" lIns="0" tIns="0" rIns="0" bIns="0" numCol="1" anchor="t" anchorCtr="0" compatLnSpc="1">
-            <a:prstTxWarp prst="textNoShape">
-              <a:avLst/>
-            </a:prstTxWarp>
-          </a:bodyPr>
+          <a:bodyPr vert="horz" wrap="square" lIns="0" tIns="0" rIns="0" bIns="0" numCol="1" anchor="t" anchorCtr="0" compatLnSpc="1"/>
           <a:lstStyle/>
           <a:p>
             <a:pPr lvl="0"/>
@@ -3015,6 +2930,7 @@
               <a:rPr lang="nl-NL" smtClean="0"/>
               <a:t>Klik om het opmaakprofiel te bewerken</a:t>
             </a:r>
+            <a:endParaRPr lang="nl-NL" smtClean="0"/>
           </a:p>
         </p:txBody>
       </p:sp>
@@ -3071,11 +2987,7 @@
           </a:extLst>
         </p:spPr>
         <p:txBody>
-          <a:bodyPr vert="horz" wrap="square" lIns="0" tIns="0" rIns="0" bIns="0" numCol="1" anchor="t" anchorCtr="0" compatLnSpc="1">
-            <a:prstTxWarp prst="textNoShape">
-              <a:avLst/>
-            </a:prstTxWarp>
-          </a:bodyPr>
+          <a:bodyPr vert="horz" wrap="square" lIns="0" tIns="0" rIns="0" bIns="0" numCol="1" anchor="t" anchorCtr="0" compatLnSpc="1"/>
           <a:lstStyle/>
           <a:p>
             <a:pPr lvl="0"/>
@@ -3091,6 +3003,7 @@
               <a:rPr lang="nl-NL" noProof="0" dirty="0" smtClean="0"/>
               <a:t> te bewerken</a:t>
             </a:r>
+            <a:endParaRPr lang="nl-NL" noProof="0" dirty="0" smtClean="0"/>
           </a:p>
           <a:p>
             <a:pPr lvl="1"/>
@@ -3098,6 +3011,7 @@
               <a:rPr lang="nl-NL" noProof="0" dirty="0" smtClean="0"/>
               <a:t>Tweede niveau</a:t>
             </a:r>
+            <a:endParaRPr lang="nl-NL" noProof="0" dirty="0" smtClean="0"/>
           </a:p>
           <a:p>
             <a:pPr lvl="2"/>
@@ -3105,6 +3019,7 @@
               <a:rPr lang="nl-NL" noProof="0" dirty="0" smtClean="0"/>
               <a:t>Derde niveau</a:t>
             </a:r>
+            <a:endParaRPr lang="nl-NL" noProof="0" dirty="0" smtClean="0"/>
           </a:p>
           <a:p>
             <a:pPr lvl="3"/>
@@ -3112,6 +3027,7 @@
               <a:rPr lang="nl-NL" noProof="0" dirty="0" smtClean="0"/>
               <a:t>Vierde niveau</a:t>
             </a:r>
+            <a:endParaRPr lang="nl-NL" noProof="0" dirty="0" smtClean="0"/>
           </a:p>
           <a:p>
             <a:pPr lvl="4"/>
@@ -3119,6 +3035,7 @@
               <a:rPr lang="nl-NL" noProof="0" dirty="0" smtClean="0"/>
               <a:t>Vijfde niveau</a:t>
             </a:r>
+            <a:endParaRPr lang="nl-NL" noProof="0" dirty="0" smtClean="0"/>
           </a:p>
           <a:p>
             <a:pPr lvl="5"/>
@@ -3126,6 +3043,7 @@
               <a:rPr lang="nl-NL" noProof="0" dirty="0" smtClean="0"/>
               <a:t>Zesde niveau</a:t>
             </a:r>
+            <a:endParaRPr lang="nl-NL" noProof="0" dirty="0" smtClean="0"/>
           </a:p>
           <a:p>
             <a:pPr lvl="6"/>
@@ -3133,6 +3051,7 @@
               <a:rPr lang="nl-NL" noProof="0" dirty="0" smtClean="0"/>
               <a:t>Zevende niveau</a:t>
             </a:r>
+            <a:endParaRPr lang="nl-NL" noProof="0" dirty="0" smtClean="0"/>
           </a:p>
           <a:p>
             <a:pPr lvl="7"/>
@@ -3140,6 +3059,7 @@
               <a:rPr lang="nl-NL" noProof="0" dirty="0" smtClean="0"/>
               <a:t>Achtste niveau</a:t>
             </a:r>
+            <a:endParaRPr lang="nl-NL" noProof="0" dirty="0" smtClean="0"/>
           </a:p>
           <a:p>
             <a:pPr lvl="8"/>
@@ -3147,6 +3067,7 @@
               <a:rPr lang="nl-NL" noProof="0" dirty="0" smtClean="0"/>
               <a:t>Negende niveau</a:t>
             </a:r>
+            <a:endParaRPr lang="nl-NL" noProof="0" dirty="0" smtClean="0"/>
           </a:p>
         </p:txBody>
       </p:sp>
@@ -3203,11 +3124,7 @@
           </a:extLst>
         </p:spPr>
         <p:txBody>
-          <a:bodyPr vert="horz" wrap="square" lIns="0" tIns="0" rIns="0" bIns="0" numCol="1" anchor="b" anchorCtr="0" compatLnSpc="1">
-            <a:prstTxWarp prst="textNoShape">
-              <a:avLst/>
-            </a:prstTxWarp>
-          </a:bodyPr>
+          <a:bodyPr vert="horz" wrap="square" lIns="0" tIns="0" rIns="0" bIns="0" numCol="1" anchor="b" anchorCtr="0" compatLnSpc="1"/>
           <a:lstStyle>
             <a:lvl1pPr algn="ctr">
               <a:defRPr sz="1000">
@@ -3275,11 +3192,7 @@
           </a:extLst>
         </p:spPr>
         <p:txBody>
-          <a:bodyPr vert="horz" wrap="square" lIns="0" tIns="0" rIns="0" bIns="0" numCol="1" anchor="b" anchorCtr="0" compatLnSpc="1">
-            <a:prstTxWarp prst="textNoShape">
-              <a:avLst/>
-            </a:prstTxWarp>
-          </a:bodyPr>
+          <a:bodyPr vert="horz" wrap="square" lIns="0" tIns="0" rIns="0" bIns="0" numCol="1" anchor="b" anchorCtr="0" compatLnSpc="1"/>
           <a:lstStyle>
             <a:lvl1pPr>
               <a:defRPr sz="1000" b="1">
@@ -3347,11 +3260,7 @@
           </a:extLst>
         </p:spPr>
         <p:txBody>
-          <a:bodyPr vert="horz" wrap="square" lIns="0" tIns="0" rIns="0" bIns="0" numCol="1" anchor="t" anchorCtr="0" compatLnSpc="1">
-            <a:prstTxWarp prst="textNoShape">
-              <a:avLst/>
-            </a:prstTxWarp>
-          </a:bodyPr>
+          <a:bodyPr vert="horz" wrap="square" lIns="0" tIns="0" rIns="0" bIns="0" numCol="1" anchor="t" anchorCtr="0" compatLnSpc="1"/>
           <a:lstStyle>
             <a:lvl1pPr algn="ctr">
               <a:defRPr sz="1000" b="1">
@@ -3364,8 +3273,6 @@
           <a:p>
             <a:fld id="{A46CB8E9-5EF0-4736-B2DB-097EB46EBB33}" type="slidenum">
               <a:rPr lang="nl-NL"/>
-              <a:pPr/>
-              <a:t>‹nr.›</a:t>
             </a:fld>
             <a:endParaRPr lang="nl-NL"/>
           </a:p>
@@ -3592,7 +3499,7 @@
           <p:nvPr userDrawn="1"/>
         </p:nvPicPr>
         <p:blipFill>
-          <a:blip r:embed="rId8">
+          <a:blip r:embed="rId7">
             <a:extLst>
               <a:ext uri="{28A0092B-C50C-407E-A947-70E740481C1C}">
                 <a14:useLocalDpi xmlns:a14="http://schemas.microsoft.com/office/drawing/2010/main" val="0"/>
@@ -3633,7 +3540,7 @@
           <p:nvPr userDrawn="1"/>
         </p:nvPicPr>
         <p:blipFill>
-          <a:blip r:embed="rId9" cstate="print">
+          <a:blip r:embed="rId8" cstate="print">
             <a:extLst>
               <a:ext uri="{28A0092B-C50C-407E-A947-70E740481C1C}">
                 <a14:useLocalDpi xmlns:a14="http://schemas.microsoft.com/office/drawing/2010/main" val="0"/>
@@ -3660,10 +3567,10 @@
   <p:sldLayoutIdLst>
     <p:sldLayoutId id="2147483649" r:id="rId1"/>
     <p:sldLayoutId id="2147483650" r:id="rId2"/>
-    <p:sldLayoutId id="2147483652" r:id="rId3"/>
-    <p:sldLayoutId id="2147483653" r:id="rId4"/>
-    <p:sldLayoutId id="2147483654" r:id="rId5"/>
-    <p:sldLayoutId id="2147483655" r:id="rId6"/>
+    <p:sldLayoutId id="2147483651" r:id="rId3"/>
+    <p:sldLayoutId id="2147483652" r:id="rId4"/>
+    <p:sldLayoutId id="2147483653" r:id="rId5"/>
+    <p:sldLayoutId id="2147483654" r:id="rId6"/>
   </p:sldLayoutIdLst>
   <p:timing>
     <p:tnLst>
@@ -3805,7 +3712,7 @@
       </a:lvl9pPr>
     </p:titleStyle>
     <p:bodyStyle>
-      <a:lvl1pPr marL="270000" indent="-270000" algn="l" rtl="0" eaLnBrk="1" fontAlgn="base" hangingPunct="1">
+      <a:lvl1pPr marL="269875" indent="-269875" algn="l" rtl="0" eaLnBrk="1" fontAlgn="base" hangingPunct="1">
         <a:spcBef>
           <a:spcPct val="20000"/>
         </a:spcBef>
@@ -3823,7 +3730,7 @@
           <a:cs typeface="+mn-cs"/>
         </a:defRPr>
       </a:lvl1pPr>
-      <a:lvl2pPr marL="540000" indent="-270000" algn="l" rtl="0" eaLnBrk="1" fontAlgn="base" hangingPunct="1">
+      <a:lvl2pPr marL="539750" indent="-269875" algn="l" rtl="0" eaLnBrk="1" fontAlgn="base" hangingPunct="1">
         <a:spcBef>
           <a:spcPct val="20000"/>
         </a:spcBef>
@@ -3841,7 +3748,7 @@
           <a:cs typeface="+mn-cs"/>
         </a:defRPr>
       </a:lvl2pPr>
-      <a:lvl3pPr marL="810000" indent="-270000" algn="l" rtl="0" eaLnBrk="1" fontAlgn="base" hangingPunct="1">
+      <a:lvl3pPr marL="810260" indent="-269875" algn="l" rtl="0" eaLnBrk="1" fontAlgn="base" hangingPunct="1">
         <a:spcBef>
           <a:spcPct val="20000"/>
         </a:spcBef>
@@ -3859,12 +3766,12 @@
           <a:cs typeface="+mn-cs"/>
         </a:defRPr>
       </a:lvl3pPr>
-      <a:lvl4pPr marL="1080000" indent="-270000" algn="l" rtl="0" eaLnBrk="1" fontAlgn="base" hangingPunct="1">
+      <a:lvl4pPr marL="1080135" indent="-269875" algn="l" rtl="0" eaLnBrk="1" fontAlgn="base" hangingPunct="1">
         <a:lnSpc>
           <a:spcPct val="100000"/>
         </a:lnSpc>
         <a:spcBef>
-          <a:spcPts val="432"/>
+          <a:spcPts val="430"/>
         </a:spcBef>
         <a:spcAft>
           <a:spcPct val="0"/>
@@ -3880,12 +3787,12 @@
           <a:cs typeface="+mn-cs"/>
         </a:defRPr>
       </a:lvl4pPr>
-      <a:lvl5pPr marL="1350000" indent="-270000" algn="l" rtl="0" eaLnBrk="1" fontAlgn="base" hangingPunct="1">
+      <a:lvl5pPr marL="1350010" indent="-269875" algn="l" rtl="0" eaLnBrk="1" fontAlgn="base" hangingPunct="1">
         <a:lnSpc>
           <a:spcPct val="100000"/>
         </a:lnSpc>
         <a:spcBef>
-          <a:spcPts val="432"/>
+          <a:spcPts val="430"/>
         </a:spcBef>
         <a:spcAft>
           <a:spcPct val="0"/>
@@ -3901,12 +3808,12 @@
           <a:cs typeface="+mn-cs"/>
         </a:defRPr>
       </a:lvl5pPr>
-      <a:lvl6pPr marL="1620000" indent="-270000" algn="l" defTabSz="914400" rtl="0" eaLnBrk="1" latinLnBrk="0" hangingPunct="1">
+      <a:lvl6pPr marL="1619885" indent="-269875" algn="l" defTabSz="914400" rtl="0" eaLnBrk="1" latinLnBrk="0" hangingPunct="1">
         <a:lnSpc>
           <a:spcPct val="100000"/>
         </a:lnSpc>
         <a:spcBef>
-          <a:spcPts val="432"/>
+          <a:spcPts val="430"/>
         </a:spcBef>
         <a:buFont typeface="Arial" panose="020B0604020202020204" pitchFamily="34" charset="0"/>
         <a:buChar char="-"/>
@@ -3919,12 +3826,12 @@
           <a:cs typeface="+mn-cs"/>
         </a:defRPr>
       </a:lvl6pPr>
-      <a:lvl7pPr marL="1890000" indent="-270000" algn="l" defTabSz="914400" rtl="0" eaLnBrk="1" latinLnBrk="0" hangingPunct="1">
+      <a:lvl7pPr marL="1889760" indent="-269875" algn="l" defTabSz="914400" rtl="0" eaLnBrk="1" latinLnBrk="0" hangingPunct="1">
         <a:lnSpc>
           <a:spcPct val="100000"/>
         </a:lnSpc>
         <a:spcBef>
-          <a:spcPts val="432"/>
+          <a:spcPts val="430"/>
         </a:spcBef>
         <a:buFont typeface="Arial" panose="020B0604020202020204" pitchFamily="34" charset="0"/>
         <a:buChar char="-"/>
@@ -3937,12 +3844,12 @@
           <a:cs typeface="+mn-cs"/>
         </a:defRPr>
       </a:lvl7pPr>
-      <a:lvl8pPr marL="2160000" indent="-270000" algn="l" defTabSz="914400" rtl="0" eaLnBrk="1" latinLnBrk="0" hangingPunct="1">
+      <a:lvl8pPr marL="2160270" indent="-269875" algn="l" defTabSz="914400" rtl="0" eaLnBrk="1" latinLnBrk="0" hangingPunct="1">
         <a:lnSpc>
           <a:spcPct val="100000"/>
         </a:lnSpc>
         <a:spcBef>
-          <a:spcPts val="432"/>
+          <a:spcPts val="430"/>
         </a:spcBef>
         <a:buFont typeface="Arial" panose="020B0604020202020204" pitchFamily="34" charset="0"/>
         <a:buChar char="-"/>
@@ -3955,12 +3862,12 @@
           <a:cs typeface="+mn-cs"/>
         </a:defRPr>
       </a:lvl8pPr>
-      <a:lvl9pPr marL="2430000" indent="-270000" algn="l" defTabSz="914400" rtl="0" eaLnBrk="1" latinLnBrk="0" hangingPunct="1">
+      <a:lvl9pPr marL="2430145" indent="-269875" algn="l" defTabSz="914400" rtl="0" eaLnBrk="1" latinLnBrk="0" hangingPunct="1">
         <a:lnSpc>
           <a:spcPct val="100000"/>
         </a:lnSpc>
         <a:spcBef>
-          <a:spcPts val="432"/>
+          <a:spcPts val="430"/>
         </a:spcBef>
         <a:buFont typeface="Arial" panose="020B0604020202020204" pitchFamily="34" charset="0"/>
         <a:buChar char="-"/>
@@ -4183,11 +4090,6 @@
         </p:txBody>
       </p:sp>
     </p:spTree>
-    <p:extLst>
-      <p:ext uri="{BB962C8B-B14F-4D97-AF65-F5344CB8AC3E}">
-        <p14:creationId xmlns:p14="http://schemas.microsoft.com/office/powerpoint/2010/main" val="970255851"/>
-      </p:ext>
-    </p:extLst>
   </p:cSld>
   <p:clrMapOvr>
     <a:masterClrMapping/>
@@ -4275,8 +4177,6 @@
           <a:p>
             <a:fld id="{7D42650C-8C65-4F3F-AFCB-9DFD34A689A0}" type="slidenum">
               <a:rPr lang="nl-NL" smtClean="0"/>
-              <a:pPr/>
-              <a:t>10</a:t>
             </a:fld>
             <a:endParaRPr lang="nl-NL"/>
           </a:p>
@@ -4291,7 +4191,7 @@
           <p:nvPr/>
         </p:nvPicPr>
         <p:blipFill>
-          <a:blip r:embed="rId2"/>
+          <a:blip r:embed="rId1"/>
           <a:stretch>
             <a:fillRect/>
           </a:stretch>
@@ -4307,11 +4207,2201 @@
         </p:spPr>
       </p:pic>
     </p:spTree>
-    <p:extLst>
-      <p:ext uri="{BB962C8B-B14F-4D97-AF65-F5344CB8AC3E}">
-        <p14:creationId xmlns:p14="http://schemas.microsoft.com/office/powerpoint/2010/main" val="1768441827"/>
-      </p:ext>
-    </p:extLst>
+  </p:cSld>
+  <p:clrMapOvr>
+    <a:masterClrMapping/>
+  </p:clrMapOvr>
+</p:sld>
+</file>
+
+<file path=ppt/slides/slide11.xml><?xml version="1.0" encoding="utf-8"?>
+<p:sld xmlns:a="http://schemas.openxmlformats.org/drawingml/2006/main" xmlns:r="http://schemas.openxmlformats.org/officeDocument/2006/relationships" xmlns:p="http://schemas.openxmlformats.org/presentationml/2006/main">
+  <p:cSld>
+    <p:spTree>
+      <p:nvGrpSpPr>
+        <p:cNvPr id="1" name=""/>
+        <p:cNvGrpSpPr/>
+        <p:nvPr/>
+      </p:nvGrpSpPr>
+      <p:grpSpPr/>
+      <p:sp>
+        <p:nvSpPr>
+          <p:cNvPr id="6" name="Title 5"/>
+          <p:cNvSpPr>
+            <a:spLocks noGrp="1"/>
+          </p:cNvSpPr>
+          <p:nvPr>
+            <p:ph type="title"/>
+          </p:nvPr>
+        </p:nvSpPr>
+        <p:spPr/>
+        <p:txBody>
+          <a:bodyPr/>
+          <a:p>
+            <a:r>
+              <a:rPr lang="en-US"/>
+              <a:t>Dependency Injection, Inversion of Control</a:t>
+            </a:r>
+            <a:endParaRPr lang="en-US"/>
+          </a:p>
+        </p:txBody>
+      </p:sp>
+      <p:sp>
+        <p:nvSpPr>
+          <p:cNvPr id="7" name="Content Placeholder 6"/>
+          <p:cNvSpPr>
+            <a:spLocks noGrp="1"/>
+          </p:cNvSpPr>
+          <p:nvPr>
+            <p:ph idx="1"/>
+          </p:nvPr>
+        </p:nvSpPr>
+        <p:spPr/>
+        <p:txBody>
+          <a:bodyPr/>
+          <a:p>
+            <a:r>
+              <a:rPr lang="en-US" sz="2200">
+                <a:sym typeface="+mn-ea"/>
+              </a:rPr>
+              <a:t>Kern van Spring Framework is Inversion of Control</a:t>
+            </a:r>
+            <a:endParaRPr lang="en-US" sz="2200"/>
+          </a:p>
+          <a:p>
+            <a:r>
+              <a:rPr lang="en-US" sz="2200">
+                <a:sym typeface="+mn-ea"/>
+              </a:rPr>
+              <a:t>IoC container beheerd java objecten</a:t>
+            </a:r>
+            <a:endParaRPr lang="en-US" sz="2200"/>
+          </a:p>
+          <a:p>
+            <a:r>
+              <a:rPr lang="en-US" sz="2200">
+                <a:sym typeface="+mn-ea"/>
+              </a:rPr>
+              <a:t>Door gebruik te maken van een Bean Factory</a:t>
+            </a:r>
+            <a:endParaRPr lang="en-US" sz="2200"/>
+          </a:p>
+          <a:p>
+            <a:endParaRPr lang="en-US" sz="2200"/>
+          </a:p>
+          <a:p>
+            <a:r>
+              <a:rPr lang="en-US" sz="2200">
+                <a:sym typeface="+mn-ea"/>
+              </a:rPr>
+              <a:t>Hollywood principe</a:t>
+            </a:r>
+            <a:endParaRPr lang="en-US" sz="2200"/>
+          </a:p>
+          <a:p>
+            <a:pPr lvl="1"/>
+            <a:r>
+              <a:rPr lang="en-US" sz="2200">
+                <a:sym typeface="+mn-ea"/>
+              </a:rPr>
+              <a:t>Don't call us, we call you</a:t>
+            </a:r>
+            <a:endParaRPr lang="en-US" sz="2200"/>
+          </a:p>
+          <a:p>
+            <a:pPr lvl="1"/>
+            <a:endParaRPr lang="en-US" sz="2200"/>
+          </a:p>
+          <a:p>
+            <a:pPr lvl="0"/>
+            <a:r>
+              <a:rPr lang="en-US" sz="2200">
+                <a:sym typeface="+mn-ea"/>
+              </a:rPr>
+              <a:t>2004 Martin Fowler</a:t>
+            </a:r>
+            <a:endParaRPr lang="en-US" sz="2200"/>
+          </a:p>
+          <a:p>
+            <a:endParaRPr lang="en-US"/>
+          </a:p>
+        </p:txBody>
+      </p:sp>
+      <p:sp>
+        <p:nvSpPr>
+          <p:cNvPr id="2" name="Date Placeholder 1"/>
+          <p:cNvSpPr>
+            <a:spLocks noGrp="1"/>
+          </p:cNvSpPr>
+          <p:nvPr>
+            <p:ph type="dt" sz="half" idx="10"/>
+          </p:nvPr>
+        </p:nvSpPr>
+        <p:spPr/>
+        <p:txBody>
+          <a:bodyPr/>
+          <a:p>
+            <a:r>
+              <a:rPr lang="nl-NL" smtClean="0"/>
+              <a:t>31 oktober 2018</a:t>
+            </a:r>
+            <a:endParaRPr lang="nl-NL"/>
+          </a:p>
+        </p:txBody>
+      </p:sp>
+      <p:sp>
+        <p:nvSpPr>
+          <p:cNvPr id="3" name="Footer Placeholder 2"/>
+          <p:cNvSpPr>
+            <a:spLocks noGrp="1"/>
+          </p:cNvSpPr>
+          <p:nvPr>
+            <p:ph type="ftr" sz="quarter" idx="11"/>
+          </p:nvPr>
+        </p:nvSpPr>
+        <p:spPr/>
+        <p:txBody>
+          <a:bodyPr/>
+          <a:p>
+            <a:r>
+              <a:rPr lang="nl-NL" smtClean="0"/>
+              <a:t>Spring Boot</a:t>
+            </a:r>
+            <a:endParaRPr lang="nl-NL"/>
+          </a:p>
+        </p:txBody>
+      </p:sp>
+      <p:sp>
+        <p:nvSpPr>
+          <p:cNvPr id="4" name="Slide Number Placeholder 3"/>
+          <p:cNvSpPr>
+            <a:spLocks noGrp="1"/>
+          </p:cNvSpPr>
+          <p:nvPr>
+            <p:ph type="sldNum" sz="quarter" idx="12"/>
+          </p:nvPr>
+        </p:nvSpPr>
+        <p:spPr/>
+        <p:txBody>
+          <a:bodyPr/>
+          <a:p>
+            <a:fld id="{7D42650C-8C65-4F3F-AFCB-9DFD34A689A0}" type="slidenum">
+              <a:rPr lang="nl-NL"/>
+            </a:fld>
+            <a:endParaRPr lang="nl-NL"/>
+          </a:p>
+        </p:txBody>
+      </p:sp>
+    </p:spTree>
+  </p:cSld>
+  <p:clrMapOvr>
+    <a:masterClrMapping/>
+  </p:clrMapOvr>
+</p:sld>
+</file>
+
+<file path=ppt/slides/slide12.xml><?xml version="1.0" encoding="utf-8"?>
+<p:sld xmlns:a="http://schemas.openxmlformats.org/drawingml/2006/main" xmlns:r="http://schemas.openxmlformats.org/officeDocument/2006/relationships" xmlns:p="http://schemas.openxmlformats.org/presentationml/2006/main">
+  <p:cSld>
+    <p:spTree>
+      <p:nvGrpSpPr>
+        <p:cNvPr id="1" name=""/>
+        <p:cNvGrpSpPr/>
+        <p:nvPr/>
+      </p:nvGrpSpPr>
+      <p:grpSpPr/>
+      <p:sp>
+        <p:nvSpPr>
+          <p:cNvPr id="5" name="Title 4"/>
+          <p:cNvSpPr>
+            <a:spLocks noGrp="1"/>
+          </p:cNvSpPr>
+          <p:nvPr>
+            <p:ph type="title"/>
+          </p:nvPr>
+        </p:nvSpPr>
+        <p:spPr/>
+        <p:txBody>
+          <a:bodyPr/>
+          <a:p>
+            <a:r>
+              <a:rPr lang="en-US">
+                <a:sym typeface="+mn-ea"/>
+              </a:rPr>
+              <a:t>Waarom is dit belangrijk</a:t>
+            </a:r>
+            <a:endParaRPr lang="en-US"/>
+          </a:p>
+        </p:txBody>
+      </p:sp>
+      <p:sp>
+        <p:nvSpPr>
+          <p:cNvPr id="6" name="Content Placeholder 5"/>
+          <p:cNvSpPr>
+            <a:spLocks noGrp="1"/>
+          </p:cNvSpPr>
+          <p:nvPr>
+            <p:ph idx="1"/>
+          </p:nvPr>
+        </p:nvSpPr>
+        <p:spPr/>
+        <p:txBody>
+          <a:bodyPr/>
+          <a:p>
+            <a:r>
+              <a:rPr lang="en-US" sz="2200">
+                <a:sym typeface="+mn-ea"/>
+              </a:rPr>
+              <a:t>Tight coupling vs loose coupling</a:t>
+            </a:r>
+            <a:endParaRPr lang="en-US" sz="2200"/>
+          </a:p>
+          <a:p>
+            <a:r>
+              <a:rPr lang="en-US" sz="2200">
+                <a:sym typeface="+mn-ea"/>
+              </a:rPr>
+              <a:t>Klasses moeten hun afhankelijkheden van buitenaf configureren</a:t>
+            </a:r>
+            <a:endParaRPr lang="en-US" sz="2200"/>
+          </a:p>
+          <a:p>
+            <a:r>
+              <a:rPr lang="en-US" sz="2200">
+                <a:sym typeface="+mn-ea"/>
+              </a:rPr>
+              <a:t>Idealiter zouden Java-klassen onafhankelijk van andere klassen moeten zijn</a:t>
+            </a:r>
+            <a:endParaRPr lang="en-US" sz="2200"/>
+          </a:p>
+          <a:p>
+            <a:pPr lvl="0"/>
+            <a:r>
+              <a:rPr lang="en-US" sz="2200">
+                <a:sym typeface="+mn-ea"/>
+              </a:rPr>
+              <a:t>Vergroot de mogelijkheid om:</a:t>
+            </a:r>
+            <a:endParaRPr lang="en-US" sz="2200"/>
+          </a:p>
+          <a:p>
+            <a:pPr lvl="1"/>
+            <a:r>
+              <a:rPr lang="en-US" sz="2200">
+                <a:sym typeface="+mn-ea"/>
+              </a:rPr>
+              <a:t>Herbruikbaarheid van de klassen</a:t>
+            </a:r>
+            <a:endParaRPr lang="en-US" sz="2200"/>
+          </a:p>
+          <a:p>
+            <a:pPr lvl="1"/>
+            <a:r>
+              <a:rPr lang="en-US" sz="2200">
+                <a:sym typeface="+mn-ea"/>
+              </a:rPr>
+              <a:t>Testen van de klassen onafhankelijk van andere klasse</a:t>
+            </a:r>
+            <a:endParaRPr lang="en-US" sz="2200"/>
+          </a:p>
+          <a:p>
+            <a:endParaRPr lang="en-US"/>
+          </a:p>
+        </p:txBody>
+      </p:sp>
+      <p:sp>
+        <p:nvSpPr>
+          <p:cNvPr id="2" name="Date Placeholder 1"/>
+          <p:cNvSpPr>
+            <a:spLocks noGrp="1"/>
+          </p:cNvSpPr>
+          <p:nvPr>
+            <p:ph type="dt" sz="half" idx="10"/>
+          </p:nvPr>
+        </p:nvSpPr>
+        <p:spPr/>
+        <p:txBody>
+          <a:bodyPr/>
+          <a:p>
+            <a:r>
+              <a:rPr lang="nl-NL" smtClean="0"/>
+              <a:t>31 oktober 2018</a:t>
+            </a:r>
+            <a:endParaRPr lang="nl-NL"/>
+          </a:p>
+        </p:txBody>
+      </p:sp>
+      <p:sp>
+        <p:nvSpPr>
+          <p:cNvPr id="3" name="Footer Placeholder 2"/>
+          <p:cNvSpPr>
+            <a:spLocks noGrp="1"/>
+          </p:cNvSpPr>
+          <p:nvPr>
+            <p:ph type="ftr" sz="quarter" idx="11"/>
+          </p:nvPr>
+        </p:nvSpPr>
+        <p:spPr/>
+        <p:txBody>
+          <a:bodyPr/>
+          <a:p>
+            <a:r>
+              <a:rPr lang="nl-NL" smtClean="0"/>
+              <a:t>Spring Boot</a:t>
+            </a:r>
+            <a:endParaRPr lang="nl-NL"/>
+          </a:p>
+        </p:txBody>
+      </p:sp>
+      <p:sp>
+        <p:nvSpPr>
+          <p:cNvPr id="4" name="Slide Number Placeholder 3"/>
+          <p:cNvSpPr>
+            <a:spLocks noGrp="1"/>
+          </p:cNvSpPr>
+          <p:nvPr>
+            <p:ph type="sldNum" sz="quarter" idx="12"/>
+          </p:nvPr>
+        </p:nvSpPr>
+        <p:spPr/>
+        <p:txBody>
+          <a:bodyPr/>
+          <a:p>
+            <a:fld id="{7D42650C-8C65-4F3F-AFCB-9DFD34A689A0}" type="slidenum">
+              <a:rPr lang="nl-NL"/>
+            </a:fld>
+            <a:endParaRPr lang="nl-NL"/>
+          </a:p>
+        </p:txBody>
+      </p:sp>
+    </p:spTree>
+  </p:cSld>
+  <p:clrMapOvr>
+    <a:masterClrMapping/>
+  </p:clrMapOvr>
+</p:sld>
+</file>
+
+<file path=ppt/slides/slide13.xml><?xml version="1.0" encoding="utf-8"?>
+<p:sld xmlns:a="http://schemas.openxmlformats.org/drawingml/2006/main" xmlns:r="http://schemas.openxmlformats.org/officeDocument/2006/relationships" xmlns:p="http://schemas.openxmlformats.org/presentationml/2006/main">
+  <p:cSld>
+    <p:spTree>
+      <p:nvGrpSpPr>
+        <p:cNvPr id="1" name=""/>
+        <p:cNvGrpSpPr/>
+        <p:nvPr/>
+      </p:nvGrpSpPr>
+      <p:grpSpPr/>
+      <p:sp>
+        <p:nvSpPr>
+          <p:cNvPr id="2" name="Title 1"/>
+          <p:cNvSpPr>
+            <a:spLocks noGrp="1"/>
+          </p:cNvSpPr>
+          <p:nvPr>
+            <p:ph type="title"/>
+          </p:nvPr>
+        </p:nvSpPr>
+        <p:spPr/>
+        <p:txBody>
+          <a:bodyPr/>
+          <a:p>
+            <a:r>
+              <a:rPr lang="en-US">
+                <a:sym typeface="+mn-ea"/>
+              </a:rPr>
+              <a:t>non-IoC POJO</a:t>
+            </a:r>
+            <a:endParaRPr lang="en-US"/>
+          </a:p>
+        </p:txBody>
+      </p:sp>
+      <p:sp>
+        <p:nvSpPr>
+          <p:cNvPr id="3" name="Content Placeholder 2"/>
+          <p:cNvSpPr>
+            <a:spLocks noGrp="1"/>
+          </p:cNvSpPr>
+          <p:nvPr>
+            <p:ph idx="1"/>
+          </p:nvPr>
+        </p:nvSpPr>
+        <p:spPr/>
+        <p:txBody>
+          <a:bodyPr/>
+          <a:p>
+            <a:pPr marL="0" indent="0">
+              <a:buNone/>
+            </a:pPr>
+            <a:r>
+              <a:rPr lang="en-US">
+                <a:sym typeface="+mn-ea"/>
+              </a:rPr>
+              <a:t>public class Course {</a:t>
+            </a:r>
+            <a:endParaRPr lang="en-US"/>
+          </a:p>
+          <a:p>
+            <a:pPr marL="0" indent="0">
+              <a:buNone/>
+            </a:pPr>
+            <a:endParaRPr lang="en-US"/>
+          </a:p>
+          <a:p>
+            <a:pPr marL="0" indent="0">
+              <a:buNone/>
+            </a:pPr>
+            <a:r>
+              <a:rPr lang="en-US" i="1">
+                <a:sym typeface="+mn-ea"/>
+              </a:rPr>
+              <a:t>    //dependency</a:t>
+            </a:r>
+            <a:endParaRPr lang="en-US"/>
+          </a:p>
+          <a:p>
+            <a:pPr marL="0" indent="0">
+              <a:buNone/>
+            </a:pPr>
+            <a:r>
+              <a:rPr lang="en-US">
+                <a:sym typeface="+mn-ea"/>
+              </a:rPr>
+              <a:t>    Student student1 = </a:t>
+            </a:r>
+            <a:r>
+              <a:rPr lang="en-US">
+                <a:sym typeface="+mn-ea"/>
+              </a:rPr>
+              <a:t>new Student("Piet");</a:t>
+            </a:r>
+            <a:endParaRPr lang="en-US">
+              <a:sym typeface="+mn-ea"/>
+            </a:endParaRPr>
+          </a:p>
+          <a:p>
+            <a:pPr marL="0" indent="0">
+              <a:buNone/>
+            </a:pPr>
+            <a:endParaRPr lang="en-US">
+              <a:sym typeface="+mn-ea"/>
+            </a:endParaRPr>
+          </a:p>
+          <a:p>
+            <a:pPr marL="0" indent="0">
+              <a:buNone/>
+            </a:pPr>
+            <a:r>
+              <a:rPr lang="en-US">
+                <a:sym typeface="+mn-ea"/>
+              </a:rPr>
+              <a:t>    Student student2 = new Student("Klaas");</a:t>
+            </a:r>
+            <a:endParaRPr lang="en-US"/>
+          </a:p>
+          <a:p>
+            <a:pPr marL="0" indent="0">
+              <a:buNone/>
+            </a:pPr>
+            <a:endParaRPr lang="en-US"/>
+          </a:p>
+          <a:p>
+            <a:pPr marL="0" indent="0">
+              <a:buNone/>
+            </a:pPr>
+            <a:r>
+              <a:rPr lang="en-US">
+                <a:sym typeface="+mn-ea"/>
+              </a:rPr>
+              <a:t>}</a:t>
+            </a:r>
+            <a:endParaRPr lang="en-US"/>
+          </a:p>
+          <a:p>
+            <a:endParaRPr lang="en-US"/>
+          </a:p>
+        </p:txBody>
+      </p:sp>
+      <p:sp>
+        <p:nvSpPr>
+          <p:cNvPr id="4" name="Date Placeholder 3"/>
+          <p:cNvSpPr>
+            <a:spLocks noGrp="1"/>
+          </p:cNvSpPr>
+          <p:nvPr>
+            <p:ph type="dt" sz="half" idx="10"/>
+          </p:nvPr>
+        </p:nvSpPr>
+        <p:spPr/>
+        <p:txBody>
+          <a:bodyPr/>
+          <a:p>
+            <a:r>
+              <a:rPr lang="nl-NL" smtClean="0"/>
+              <a:t>31 oktober 2018</a:t>
+            </a:r>
+            <a:endParaRPr lang="nl-NL"/>
+          </a:p>
+        </p:txBody>
+      </p:sp>
+      <p:sp>
+        <p:nvSpPr>
+          <p:cNvPr id="5" name="Footer Placeholder 4"/>
+          <p:cNvSpPr>
+            <a:spLocks noGrp="1"/>
+          </p:cNvSpPr>
+          <p:nvPr>
+            <p:ph type="ftr" sz="quarter" idx="11"/>
+          </p:nvPr>
+        </p:nvSpPr>
+        <p:spPr/>
+        <p:txBody>
+          <a:bodyPr/>
+          <a:p>
+            <a:r>
+              <a:rPr lang="nl-NL" smtClean="0"/>
+              <a:t>Spring Boot</a:t>
+            </a:r>
+            <a:endParaRPr lang="nl-NL"/>
+          </a:p>
+        </p:txBody>
+      </p:sp>
+      <p:sp>
+        <p:nvSpPr>
+          <p:cNvPr id="6" name="Slide Number Placeholder 5"/>
+          <p:cNvSpPr>
+            <a:spLocks noGrp="1"/>
+          </p:cNvSpPr>
+          <p:nvPr>
+            <p:ph type="sldNum" sz="quarter" idx="12"/>
+          </p:nvPr>
+        </p:nvSpPr>
+        <p:spPr/>
+        <p:txBody>
+          <a:bodyPr/>
+          <a:p>
+            <a:fld id="{204CA5A0-4B1D-4A14-8811-788AE825D559}" type="slidenum">
+              <a:rPr lang="nl-NL"/>
+            </a:fld>
+            <a:endParaRPr lang="nl-NL"/>
+          </a:p>
+        </p:txBody>
+      </p:sp>
+    </p:spTree>
+  </p:cSld>
+  <p:clrMapOvr>
+    <a:masterClrMapping/>
+  </p:clrMapOvr>
+</p:sld>
+</file>
+
+<file path=ppt/slides/slide14.xml><?xml version="1.0" encoding="utf-8"?>
+<p:sld xmlns:a="http://schemas.openxmlformats.org/drawingml/2006/main" xmlns:r="http://schemas.openxmlformats.org/officeDocument/2006/relationships" xmlns:p="http://schemas.openxmlformats.org/presentationml/2006/main">
+  <p:cSld>
+    <p:spTree>
+      <p:nvGrpSpPr>
+        <p:cNvPr id="1" name=""/>
+        <p:cNvGrpSpPr/>
+        <p:nvPr/>
+      </p:nvGrpSpPr>
+      <p:grpSpPr/>
+      <p:sp>
+        <p:nvSpPr>
+          <p:cNvPr id="2" name="Title 1"/>
+          <p:cNvSpPr>
+            <a:spLocks noGrp="1"/>
+          </p:cNvSpPr>
+          <p:nvPr>
+            <p:ph type="title"/>
+          </p:nvPr>
+        </p:nvSpPr>
+        <p:spPr/>
+        <p:txBody>
+          <a:bodyPr/>
+          <a:p>
+            <a:r>
+              <a:rPr lang="en-US">
+                <a:sym typeface="+mn-ea"/>
+              </a:rPr>
+              <a:t>non-IoC POJO</a:t>
+            </a:r>
+            <a:endParaRPr lang="en-US"/>
+          </a:p>
+        </p:txBody>
+      </p:sp>
+      <p:sp>
+        <p:nvSpPr>
+          <p:cNvPr id="4" name="Date Placeholder 3"/>
+          <p:cNvSpPr>
+            <a:spLocks noGrp="1"/>
+          </p:cNvSpPr>
+          <p:nvPr>
+            <p:ph type="dt" sz="half" idx="10"/>
+          </p:nvPr>
+        </p:nvSpPr>
+        <p:spPr/>
+        <p:txBody>
+          <a:bodyPr/>
+          <a:p>
+            <a:r>
+              <a:rPr lang="nl-NL" smtClean="0"/>
+              <a:t>31 oktober 2018</a:t>
+            </a:r>
+            <a:endParaRPr lang="nl-NL"/>
+          </a:p>
+        </p:txBody>
+      </p:sp>
+      <p:sp>
+        <p:nvSpPr>
+          <p:cNvPr id="5" name="Footer Placeholder 4"/>
+          <p:cNvSpPr>
+            <a:spLocks noGrp="1"/>
+          </p:cNvSpPr>
+          <p:nvPr>
+            <p:ph type="ftr" sz="quarter" idx="11"/>
+          </p:nvPr>
+        </p:nvSpPr>
+        <p:spPr/>
+        <p:txBody>
+          <a:bodyPr/>
+          <a:p>
+            <a:r>
+              <a:rPr lang="nl-NL" smtClean="0"/>
+              <a:t>Spring Boot</a:t>
+            </a:r>
+            <a:endParaRPr lang="nl-NL"/>
+          </a:p>
+        </p:txBody>
+      </p:sp>
+      <p:sp>
+        <p:nvSpPr>
+          <p:cNvPr id="6" name="Slide Number Placeholder 5"/>
+          <p:cNvSpPr>
+            <a:spLocks noGrp="1"/>
+          </p:cNvSpPr>
+          <p:nvPr>
+            <p:ph type="sldNum" sz="quarter" idx="12"/>
+          </p:nvPr>
+        </p:nvSpPr>
+        <p:spPr/>
+        <p:txBody>
+          <a:bodyPr/>
+          <a:p>
+            <a:fld id="{204CA5A0-4B1D-4A14-8811-788AE825D559}" type="slidenum">
+              <a:rPr lang="nl-NL"/>
+            </a:fld>
+            <a:endParaRPr lang="nl-NL"/>
+          </a:p>
+        </p:txBody>
+      </p:sp>
+      <p:sp>
+        <p:nvSpPr>
+          <p:cNvPr id="13" name="Oval 12"/>
+          <p:cNvSpPr/>
+          <p:nvPr/>
+        </p:nvSpPr>
+        <p:spPr>
+          <a:xfrm>
+            <a:off x="2035810" y="3488055"/>
+            <a:ext cx="1670050" cy="1653540"/>
+          </a:xfrm>
+          <a:prstGeom prst="ellipse">
+            <a:avLst/>
+          </a:prstGeom>
+        </p:spPr>
+        <p:style>
+          <a:lnRef idx="2">
+            <a:schemeClr val="accent1">
+              <a:shade val="50000"/>
+            </a:schemeClr>
+          </a:lnRef>
+          <a:fillRef idx="1">
+            <a:schemeClr val="accent1"/>
+          </a:fillRef>
+          <a:effectRef idx="0">
+            <a:schemeClr val="accent1"/>
+          </a:effectRef>
+          <a:fontRef idx="minor">
+            <a:schemeClr val="lt1"/>
+          </a:fontRef>
+        </p:style>
+        <p:txBody>
+          <a:bodyPr rtlCol="0" anchor="ctr"/>
+          <a:p>
+            <a:pPr algn="ctr"/>
+            <a:r>
+              <a:rPr lang="en-US"/>
+              <a:t>Course</a:t>
+            </a:r>
+            <a:endParaRPr lang="en-US"/>
+          </a:p>
+        </p:txBody>
+      </p:sp>
+      <p:sp>
+        <p:nvSpPr>
+          <p:cNvPr id="14" name="Oval 13"/>
+          <p:cNvSpPr/>
+          <p:nvPr/>
+        </p:nvSpPr>
+        <p:spPr>
+          <a:xfrm>
+            <a:off x="5409565" y="2576830"/>
+            <a:ext cx="1670050" cy="1653540"/>
+          </a:xfrm>
+          <a:prstGeom prst="ellipse">
+            <a:avLst/>
+          </a:prstGeom>
+        </p:spPr>
+        <p:style>
+          <a:lnRef idx="2">
+            <a:schemeClr val="accent1">
+              <a:shade val="50000"/>
+            </a:schemeClr>
+          </a:lnRef>
+          <a:fillRef idx="1">
+            <a:schemeClr val="accent1"/>
+          </a:fillRef>
+          <a:effectRef idx="0">
+            <a:schemeClr val="accent1"/>
+          </a:effectRef>
+          <a:fontRef idx="minor">
+            <a:schemeClr val="lt1"/>
+          </a:fontRef>
+        </p:style>
+        <p:txBody>
+          <a:bodyPr rtlCol="0" anchor="ctr"/>
+          <a:p>
+            <a:pPr algn="ctr"/>
+            <a:r>
+              <a:rPr lang="en-US"/>
+              <a:t>Student A</a:t>
+            </a:r>
+            <a:endParaRPr lang="en-US"/>
+          </a:p>
+        </p:txBody>
+      </p:sp>
+      <p:sp>
+        <p:nvSpPr>
+          <p:cNvPr id="15" name="Oval 14"/>
+          <p:cNvSpPr/>
+          <p:nvPr/>
+        </p:nvSpPr>
+        <p:spPr>
+          <a:xfrm>
+            <a:off x="5409565" y="4681855"/>
+            <a:ext cx="1670050" cy="1653540"/>
+          </a:xfrm>
+          <a:prstGeom prst="ellipse">
+            <a:avLst/>
+          </a:prstGeom>
+        </p:spPr>
+        <p:style>
+          <a:lnRef idx="2">
+            <a:schemeClr val="accent1">
+              <a:shade val="50000"/>
+            </a:schemeClr>
+          </a:lnRef>
+          <a:fillRef idx="1">
+            <a:schemeClr val="accent1"/>
+          </a:fillRef>
+          <a:effectRef idx="0">
+            <a:schemeClr val="accent1"/>
+          </a:effectRef>
+          <a:fontRef idx="minor">
+            <a:schemeClr val="lt1"/>
+          </a:fontRef>
+        </p:style>
+        <p:txBody>
+          <a:bodyPr rtlCol="0" anchor="ctr"/>
+          <a:p>
+            <a:pPr algn="ctr"/>
+            <a:r>
+              <a:rPr lang="en-US"/>
+              <a:t>Student B</a:t>
+            </a:r>
+            <a:endParaRPr lang="en-US"/>
+          </a:p>
+        </p:txBody>
+      </p:sp>
+      <p:cxnSp>
+        <p:nvCxnSpPr>
+          <p:cNvPr id="16" name="Straight Arrow Connector 15"/>
+          <p:cNvCxnSpPr>
+            <a:endCxn id="14" idx="2"/>
+          </p:cNvCxnSpPr>
+          <p:nvPr/>
+        </p:nvCxnSpPr>
+        <p:spPr>
+          <a:xfrm flipV="1">
+            <a:off x="3425825" y="3403600"/>
+            <a:ext cx="1983740" cy="749935"/>
+          </a:xfrm>
+          <a:prstGeom prst="straightConnector1">
+            <a:avLst/>
+          </a:prstGeom>
+          <a:ln>
+            <a:tailEnd type="arrow"/>
+          </a:ln>
+        </p:spPr>
+        <p:style>
+          <a:lnRef idx="1">
+            <a:schemeClr val="accent1"/>
+          </a:lnRef>
+          <a:fillRef idx="0">
+            <a:schemeClr val="accent1"/>
+          </a:fillRef>
+          <a:effectRef idx="0">
+            <a:schemeClr val="accent1"/>
+          </a:effectRef>
+          <a:fontRef idx="minor">
+            <a:schemeClr val="tx1"/>
+          </a:fontRef>
+        </p:style>
+      </p:cxnSp>
+      <p:cxnSp>
+        <p:nvCxnSpPr>
+          <p:cNvPr id="17" name="Straight Arrow Connector 16"/>
+          <p:cNvCxnSpPr/>
+          <p:nvPr/>
+        </p:nvCxnSpPr>
+        <p:spPr>
+          <a:xfrm>
+            <a:off x="3413760" y="4570095"/>
+            <a:ext cx="1924685" cy="825500"/>
+          </a:xfrm>
+          <a:prstGeom prst="straightConnector1">
+            <a:avLst/>
+          </a:prstGeom>
+          <a:ln>
+            <a:tailEnd type="arrow"/>
+          </a:ln>
+        </p:spPr>
+        <p:style>
+          <a:lnRef idx="1">
+            <a:schemeClr val="accent1"/>
+          </a:lnRef>
+          <a:fillRef idx="0">
+            <a:schemeClr val="accent1"/>
+          </a:fillRef>
+          <a:effectRef idx="0">
+            <a:schemeClr val="accent1"/>
+          </a:effectRef>
+          <a:fontRef idx="minor">
+            <a:schemeClr val="tx1"/>
+          </a:fontRef>
+        </p:style>
+      </p:cxnSp>
+      <p:sp>
+        <p:nvSpPr>
+          <p:cNvPr id="18" name="Text Box 17"/>
+          <p:cNvSpPr txBox="1"/>
+          <p:nvPr/>
+        </p:nvSpPr>
+        <p:spPr>
+          <a:xfrm>
+            <a:off x="1891030" y="2497455"/>
+            <a:ext cx="3840480" cy="368300"/>
+          </a:xfrm>
+          <a:prstGeom prst="rect">
+            <a:avLst/>
+          </a:prstGeom>
+          <a:noFill/>
+        </p:spPr>
+        <p:txBody>
+          <a:bodyPr wrap="square" rtlCol="0">
+            <a:spAutoFit/>
+          </a:bodyPr>
+          <a:p>
+            <a:r>
+              <a:rPr lang="en-US"/>
+              <a:t>Student a = new Student()</a:t>
+            </a:r>
+            <a:endParaRPr lang="en-US"/>
+          </a:p>
+        </p:txBody>
+      </p:sp>
+      <p:sp>
+        <p:nvSpPr>
+          <p:cNvPr id="19" name="Text Box 18"/>
+          <p:cNvSpPr txBox="1"/>
+          <p:nvPr/>
+        </p:nvSpPr>
+        <p:spPr>
+          <a:xfrm>
+            <a:off x="1891030" y="6047740"/>
+            <a:ext cx="3840480" cy="368300"/>
+          </a:xfrm>
+          <a:prstGeom prst="rect">
+            <a:avLst/>
+          </a:prstGeom>
+          <a:noFill/>
+        </p:spPr>
+        <p:txBody>
+          <a:bodyPr wrap="square" rtlCol="0">
+            <a:spAutoFit/>
+          </a:bodyPr>
+          <a:p>
+            <a:r>
+              <a:rPr lang="en-US"/>
+              <a:t>Student b = new Student()</a:t>
+            </a:r>
+            <a:endParaRPr lang="en-US"/>
+          </a:p>
+        </p:txBody>
+      </p:sp>
+    </p:spTree>
+  </p:cSld>
+  <p:clrMapOvr>
+    <a:masterClrMapping/>
+  </p:clrMapOvr>
+</p:sld>
+</file>
+
+<file path=ppt/slides/slide15.xml><?xml version="1.0" encoding="utf-8"?>
+<p:sld xmlns:a="http://schemas.openxmlformats.org/drawingml/2006/main" xmlns:r="http://schemas.openxmlformats.org/officeDocument/2006/relationships" xmlns:p="http://schemas.openxmlformats.org/presentationml/2006/main">
+  <p:cSld>
+    <p:spTree>
+      <p:nvGrpSpPr>
+        <p:cNvPr id="1" name=""/>
+        <p:cNvGrpSpPr/>
+        <p:nvPr/>
+      </p:nvGrpSpPr>
+      <p:grpSpPr/>
+      <p:sp>
+        <p:nvSpPr>
+          <p:cNvPr id="2" name="Title 1"/>
+          <p:cNvSpPr>
+            <a:spLocks noGrp="1"/>
+          </p:cNvSpPr>
+          <p:nvPr>
+            <p:ph type="title"/>
+          </p:nvPr>
+        </p:nvSpPr>
+        <p:spPr/>
+        <p:txBody>
+          <a:bodyPr/>
+          <a:p>
+            <a:r>
+              <a:rPr lang="en-US">
+                <a:sym typeface="+mn-ea"/>
+              </a:rPr>
+              <a:t>IoC - Dependency Injection - POJO</a:t>
+            </a:r>
+            <a:br>
+              <a:rPr lang="en-US"/>
+            </a:br>
+            <a:endParaRPr lang="en-US"/>
+          </a:p>
+        </p:txBody>
+      </p:sp>
+      <p:sp>
+        <p:nvSpPr>
+          <p:cNvPr id="4" name="Date Placeholder 3"/>
+          <p:cNvSpPr>
+            <a:spLocks noGrp="1"/>
+          </p:cNvSpPr>
+          <p:nvPr>
+            <p:ph type="dt" sz="half" idx="10"/>
+          </p:nvPr>
+        </p:nvSpPr>
+        <p:spPr/>
+        <p:txBody>
+          <a:bodyPr/>
+          <a:p>
+            <a:r>
+              <a:rPr lang="nl-NL" smtClean="0"/>
+              <a:t>31 oktober 2018</a:t>
+            </a:r>
+            <a:endParaRPr lang="nl-NL"/>
+          </a:p>
+        </p:txBody>
+      </p:sp>
+      <p:sp>
+        <p:nvSpPr>
+          <p:cNvPr id="5" name="Footer Placeholder 4"/>
+          <p:cNvSpPr>
+            <a:spLocks noGrp="1"/>
+          </p:cNvSpPr>
+          <p:nvPr>
+            <p:ph type="ftr" sz="quarter" idx="11"/>
+          </p:nvPr>
+        </p:nvSpPr>
+        <p:spPr/>
+        <p:txBody>
+          <a:bodyPr/>
+          <a:p>
+            <a:r>
+              <a:rPr lang="nl-NL" smtClean="0"/>
+              <a:t>Spring Boot</a:t>
+            </a:r>
+            <a:endParaRPr lang="nl-NL"/>
+          </a:p>
+        </p:txBody>
+      </p:sp>
+      <p:sp>
+        <p:nvSpPr>
+          <p:cNvPr id="6" name="Slide Number Placeholder 5"/>
+          <p:cNvSpPr>
+            <a:spLocks noGrp="1"/>
+          </p:cNvSpPr>
+          <p:nvPr>
+            <p:ph type="sldNum" sz="quarter" idx="12"/>
+          </p:nvPr>
+        </p:nvSpPr>
+        <p:spPr/>
+        <p:txBody>
+          <a:bodyPr/>
+          <a:p>
+            <a:fld id="{204CA5A0-4B1D-4A14-8811-788AE825D559}" type="slidenum">
+              <a:rPr lang="nl-NL"/>
+            </a:fld>
+            <a:endParaRPr lang="nl-NL"/>
+          </a:p>
+        </p:txBody>
+      </p:sp>
+      <p:sp>
+        <p:nvSpPr>
+          <p:cNvPr id="7" name="Oval 6"/>
+          <p:cNvSpPr/>
+          <p:nvPr/>
+        </p:nvSpPr>
+        <p:spPr>
+          <a:xfrm>
+            <a:off x="2337435" y="3599180"/>
+            <a:ext cx="1670050" cy="1653540"/>
+          </a:xfrm>
+          <a:prstGeom prst="ellipse">
+            <a:avLst/>
+          </a:prstGeom>
+        </p:spPr>
+        <p:style>
+          <a:lnRef idx="2">
+            <a:schemeClr val="accent1">
+              <a:shade val="50000"/>
+            </a:schemeClr>
+          </a:lnRef>
+          <a:fillRef idx="1">
+            <a:schemeClr val="accent1"/>
+          </a:fillRef>
+          <a:effectRef idx="0">
+            <a:schemeClr val="accent1"/>
+          </a:effectRef>
+          <a:fontRef idx="minor">
+            <a:schemeClr val="lt1"/>
+          </a:fontRef>
+        </p:style>
+        <p:txBody>
+          <a:bodyPr rtlCol="0" anchor="ctr"/>
+          <a:p>
+            <a:pPr algn="ctr"/>
+            <a:r>
+              <a:rPr lang="en-US"/>
+              <a:t>Course</a:t>
+            </a:r>
+            <a:endParaRPr lang="en-US"/>
+          </a:p>
+        </p:txBody>
+      </p:sp>
+      <p:sp>
+        <p:nvSpPr>
+          <p:cNvPr id="8" name="Oval 7"/>
+          <p:cNvSpPr/>
+          <p:nvPr/>
+        </p:nvSpPr>
+        <p:spPr>
+          <a:xfrm>
+            <a:off x="5711190" y="2687955"/>
+            <a:ext cx="1670050" cy="1653540"/>
+          </a:xfrm>
+          <a:prstGeom prst="ellipse">
+            <a:avLst/>
+          </a:prstGeom>
+        </p:spPr>
+        <p:style>
+          <a:lnRef idx="2">
+            <a:schemeClr val="accent1">
+              <a:shade val="50000"/>
+            </a:schemeClr>
+          </a:lnRef>
+          <a:fillRef idx="1">
+            <a:schemeClr val="accent1"/>
+          </a:fillRef>
+          <a:effectRef idx="0">
+            <a:schemeClr val="accent1"/>
+          </a:effectRef>
+          <a:fontRef idx="minor">
+            <a:schemeClr val="lt1"/>
+          </a:fontRef>
+        </p:style>
+        <p:txBody>
+          <a:bodyPr rtlCol="0" anchor="ctr"/>
+          <a:p>
+            <a:pPr algn="ctr"/>
+            <a:r>
+              <a:rPr lang="en-US"/>
+              <a:t>Student A</a:t>
+            </a:r>
+            <a:endParaRPr lang="en-US"/>
+          </a:p>
+        </p:txBody>
+      </p:sp>
+      <p:sp>
+        <p:nvSpPr>
+          <p:cNvPr id="9" name="Oval 8"/>
+          <p:cNvSpPr/>
+          <p:nvPr/>
+        </p:nvSpPr>
+        <p:spPr>
+          <a:xfrm>
+            <a:off x="5711190" y="4792980"/>
+            <a:ext cx="1670050" cy="1653540"/>
+          </a:xfrm>
+          <a:prstGeom prst="ellipse">
+            <a:avLst/>
+          </a:prstGeom>
+        </p:spPr>
+        <p:style>
+          <a:lnRef idx="2">
+            <a:schemeClr val="accent1">
+              <a:shade val="50000"/>
+            </a:schemeClr>
+          </a:lnRef>
+          <a:fillRef idx="1">
+            <a:schemeClr val="accent1"/>
+          </a:fillRef>
+          <a:effectRef idx="0">
+            <a:schemeClr val="accent1"/>
+          </a:effectRef>
+          <a:fontRef idx="minor">
+            <a:schemeClr val="lt1"/>
+          </a:fontRef>
+        </p:style>
+        <p:txBody>
+          <a:bodyPr rtlCol="0" anchor="ctr"/>
+          <a:p>
+            <a:pPr algn="ctr"/>
+            <a:r>
+              <a:rPr lang="en-US"/>
+              <a:t>Student B</a:t>
+            </a:r>
+            <a:endParaRPr lang="en-US"/>
+          </a:p>
+        </p:txBody>
+      </p:sp>
+      <p:cxnSp>
+        <p:nvCxnSpPr>
+          <p:cNvPr id="10" name="Straight Arrow Connector 9"/>
+          <p:cNvCxnSpPr>
+            <a:stCxn id="8" idx="2"/>
+            <a:endCxn id="7" idx="7"/>
+          </p:cNvCxnSpPr>
+          <p:nvPr/>
+        </p:nvCxnSpPr>
+        <p:spPr>
+          <a:xfrm flipH="1">
+            <a:off x="3763010" y="3514725"/>
+            <a:ext cx="1948180" cy="326390"/>
+          </a:xfrm>
+          <a:prstGeom prst="straightConnector1">
+            <a:avLst/>
+          </a:prstGeom>
+          <a:ln>
+            <a:tailEnd type="arrow"/>
+          </a:ln>
+        </p:spPr>
+        <p:style>
+          <a:lnRef idx="1">
+            <a:schemeClr val="accent1"/>
+          </a:lnRef>
+          <a:fillRef idx="0">
+            <a:schemeClr val="accent1"/>
+          </a:fillRef>
+          <a:effectRef idx="0">
+            <a:schemeClr val="accent1"/>
+          </a:effectRef>
+          <a:fontRef idx="minor">
+            <a:schemeClr val="tx1"/>
+          </a:fontRef>
+        </p:style>
+      </p:cxnSp>
+      <p:cxnSp>
+        <p:nvCxnSpPr>
+          <p:cNvPr id="11" name="Straight Arrow Connector 10"/>
+          <p:cNvCxnSpPr/>
+          <p:nvPr/>
+        </p:nvCxnSpPr>
+        <p:spPr>
+          <a:xfrm flipH="1" flipV="1">
+            <a:off x="3834130" y="5073650"/>
+            <a:ext cx="1855470" cy="476250"/>
+          </a:xfrm>
+          <a:prstGeom prst="straightConnector1">
+            <a:avLst/>
+          </a:prstGeom>
+          <a:ln>
+            <a:tailEnd type="arrow"/>
+          </a:ln>
+        </p:spPr>
+        <p:style>
+          <a:lnRef idx="1">
+            <a:schemeClr val="accent1"/>
+          </a:lnRef>
+          <a:fillRef idx="0">
+            <a:schemeClr val="accent1"/>
+          </a:fillRef>
+          <a:effectRef idx="0">
+            <a:schemeClr val="accent1"/>
+          </a:effectRef>
+          <a:fontRef idx="minor">
+            <a:schemeClr val="tx1"/>
+          </a:fontRef>
+        </p:style>
+      </p:cxnSp>
+      <p:sp>
+        <p:nvSpPr>
+          <p:cNvPr id="12" name="Text Box 11"/>
+          <p:cNvSpPr txBox="1"/>
+          <p:nvPr/>
+        </p:nvSpPr>
+        <p:spPr>
+          <a:xfrm>
+            <a:off x="2192655" y="2608580"/>
+            <a:ext cx="3840480" cy="368300"/>
+          </a:xfrm>
+          <a:prstGeom prst="rect">
+            <a:avLst/>
+          </a:prstGeom>
+          <a:noFill/>
+        </p:spPr>
+        <p:txBody>
+          <a:bodyPr wrap="square" rtlCol="0">
+            <a:spAutoFit/>
+          </a:bodyPr>
+          <a:p>
+            <a:r>
+              <a:rPr lang="en-US"/>
+              <a:t>course.setStudent(a)</a:t>
+            </a:r>
+            <a:endParaRPr lang="en-US"/>
+          </a:p>
+        </p:txBody>
+      </p:sp>
+      <p:sp>
+        <p:nvSpPr>
+          <p:cNvPr id="13" name="Text Box 12"/>
+          <p:cNvSpPr txBox="1"/>
+          <p:nvPr/>
+        </p:nvSpPr>
+        <p:spPr>
+          <a:xfrm>
+            <a:off x="2192655" y="6158865"/>
+            <a:ext cx="3840480" cy="368300"/>
+          </a:xfrm>
+          <a:prstGeom prst="rect">
+            <a:avLst/>
+          </a:prstGeom>
+          <a:noFill/>
+        </p:spPr>
+        <p:txBody>
+          <a:bodyPr wrap="square" rtlCol="0">
+            <a:spAutoFit/>
+          </a:bodyPr>
+          <a:p>
+            <a:r>
+              <a:rPr lang="en-US"/>
+              <a:t>course.setStudent(b)</a:t>
+            </a:r>
+            <a:endParaRPr lang="en-US"/>
+          </a:p>
+        </p:txBody>
+      </p:sp>
+    </p:spTree>
+  </p:cSld>
+  <p:clrMapOvr>
+    <a:masterClrMapping/>
+  </p:clrMapOvr>
+</p:sld>
+</file>
+
+<file path=ppt/slides/slide16.xml><?xml version="1.0" encoding="utf-8"?>
+<p:sld xmlns:a="http://schemas.openxmlformats.org/drawingml/2006/main" xmlns:r="http://schemas.openxmlformats.org/officeDocument/2006/relationships" xmlns:p="http://schemas.openxmlformats.org/presentationml/2006/main">
+  <p:cSld>
+    <p:spTree>
+      <p:nvGrpSpPr>
+        <p:cNvPr id="1" name=""/>
+        <p:cNvGrpSpPr/>
+        <p:nvPr/>
+      </p:nvGrpSpPr>
+      <p:grpSpPr/>
+      <p:sp>
+        <p:nvSpPr>
+          <p:cNvPr id="2" name="Title 1"/>
+          <p:cNvSpPr>
+            <a:spLocks noGrp="1"/>
+          </p:cNvSpPr>
+          <p:nvPr>
+            <p:ph type="title"/>
+          </p:nvPr>
+        </p:nvSpPr>
+        <p:spPr/>
+        <p:txBody>
+          <a:bodyPr/>
+          <a:p>
+            <a:r>
+              <a:rPr lang="en-US">
+                <a:sym typeface="+mn-ea"/>
+              </a:rPr>
+              <a:t>IoC - Dependency Injection - POJO</a:t>
+            </a:r>
+            <a:br>
+              <a:rPr lang="en-US"/>
+            </a:br>
+            <a:endParaRPr lang="en-US"/>
+          </a:p>
+        </p:txBody>
+      </p:sp>
+      <p:sp>
+        <p:nvSpPr>
+          <p:cNvPr id="3" name="Content Placeholder 2"/>
+          <p:cNvSpPr>
+            <a:spLocks noGrp="1"/>
+          </p:cNvSpPr>
+          <p:nvPr>
+            <p:ph idx="1"/>
+          </p:nvPr>
+        </p:nvSpPr>
+        <p:spPr/>
+        <p:txBody>
+          <a:bodyPr/>
+          <a:p>
+            <a:pPr marL="0" indent="0">
+              <a:buNone/>
+            </a:pPr>
+            <a:r>
+              <a:rPr lang="en-US">
+                <a:sym typeface="+mn-ea"/>
+              </a:rPr>
+              <a:t>public class Application {</a:t>
+            </a:r>
+            <a:endParaRPr lang="en-US"/>
+          </a:p>
+          <a:p>
+            <a:pPr marL="0" indent="0">
+              <a:buNone/>
+            </a:pPr>
+            <a:r>
+              <a:rPr lang="en-US">
+                <a:sym typeface="+mn-ea"/>
+              </a:rPr>
+              <a:t>    public static void main(String[] args){</a:t>
+            </a:r>
+            <a:endParaRPr lang="en-US"/>
+          </a:p>
+          <a:p>
+            <a:pPr marL="0" indent="0">
+              <a:buNone/>
+            </a:pPr>
+            <a:r>
+              <a:rPr lang="en-US">
+                <a:sym typeface="+mn-ea"/>
+              </a:rPr>
+              <a:t>        Course course = new Course();</a:t>
+            </a:r>
+            <a:endParaRPr lang="en-US"/>
+          </a:p>
+          <a:p>
+            <a:pPr marL="0" indent="0">
+              <a:buNone/>
+            </a:pPr>
+            <a:endParaRPr lang="en-US"/>
+          </a:p>
+          <a:p>
+            <a:pPr marL="0" indent="0">
+              <a:buNone/>
+            </a:pPr>
+            <a:r>
+              <a:rPr lang="en-US">
+                <a:sym typeface="+mn-ea"/>
+              </a:rPr>
+              <a:t>        course.setStudents(new Student("Piet"));</a:t>
+            </a:r>
+            <a:endParaRPr lang="en-US"/>
+          </a:p>
+          <a:p>
+            <a:pPr marL="0" indent="0">
+              <a:buNone/>
+            </a:pPr>
+            <a:r>
+              <a:rPr lang="en-US">
+                <a:sym typeface="+mn-ea"/>
+              </a:rPr>
+              <a:t>        course.setStudents(new Student("Klaas"));</a:t>
+            </a:r>
+            <a:endParaRPr lang="en-US"/>
+          </a:p>
+          <a:p>
+            <a:pPr marL="0" indent="0">
+              <a:buNone/>
+            </a:pPr>
+            <a:r>
+              <a:rPr lang="en-US">
+                <a:sym typeface="+mn-ea"/>
+              </a:rPr>
+              <a:t>    }</a:t>
+            </a:r>
+            <a:endParaRPr lang="en-US"/>
+          </a:p>
+          <a:p>
+            <a:pPr marL="0" indent="0">
+              <a:buNone/>
+            </a:pPr>
+            <a:r>
+              <a:rPr lang="en-US">
+                <a:sym typeface="+mn-ea"/>
+              </a:rPr>
+              <a:t>}</a:t>
+            </a:r>
+            <a:endParaRPr lang="en-US"/>
+          </a:p>
+          <a:p>
+            <a:endParaRPr lang="en-US"/>
+          </a:p>
+        </p:txBody>
+      </p:sp>
+      <p:sp>
+        <p:nvSpPr>
+          <p:cNvPr id="4" name="Date Placeholder 3"/>
+          <p:cNvSpPr>
+            <a:spLocks noGrp="1"/>
+          </p:cNvSpPr>
+          <p:nvPr>
+            <p:ph type="dt" sz="half" idx="10"/>
+          </p:nvPr>
+        </p:nvSpPr>
+        <p:spPr/>
+        <p:txBody>
+          <a:bodyPr/>
+          <a:p>
+            <a:r>
+              <a:rPr lang="nl-NL" smtClean="0"/>
+              <a:t>31 oktober 2018</a:t>
+            </a:r>
+            <a:endParaRPr lang="nl-NL"/>
+          </a:p>
+        </p:txBody>
+      </p:sp>
+      <p:sp>
+        <p:nvSpPr>
+          <p:cNvPr id="5" name="Footer Placeholder 4"/>
+          <p:cNvSpPr>
+            <a:spLocks noGrp="1"/>
+          </p:cNvSpPr>
+          <p:nvPr>
+            <p:ph type="ftr" sz="quarter" idx="11"/>
+          </p:nvPr>
+        </p:nvSpPr>
+        <p:spPr/>
+        <p:txBody>
+          <a:bodyPr/>
+          <a:p>
+            <a:r>
+              <a:rPr lang="nl-NL" smtClean="0"/>
+              <a:t>Spring Boot</a:t>
+            </a:r>
+            <a:endParaRPr lang="nl-NL"/>
+          </a:p>
+        </p:txBody>
+      </p:sp>
+      <p:sp>
+        <p:nvSpPr>
+          <p:cNvPr id="6" name="Slide Number Placeholder 5"/>
+          <p:cNvSpPr>
+            <a:spLocks noGrp="1"/>
+          </p:cNvSpPr>
+          <p:nvPr>
+            <p:ph type="sldNum" sz="quarter" idx="12"/>
+          </p:nvPr>
+        </p:nvSpPr>
+        <p:spPr/>
+        <p:txBody>
+          <a:bodyPr/>
+          <a:p>
+            <a:fld id="{204CA5A0-4B1D-4A14-8811-788AE825D559}" type="slidenum">
+              <a:rPr lang="nl-NL"/>
+            </a:fld>
+            <a:endParaRPr lang="nl-NL"/>
+          </a:p>
+        </p:txBody>
+      </p:sp>
+    </p:spTree>
+  </p:cSld>
+  <p:clrMapOvr>
+    <a:masterClrMapping/>
+  </p:clrMapOvr>
+</p:sld>
+</file>
+
+<file path=ppt/slides/slide17.xml><?xml version="1.0" encoding="utf-8"?>
+<p:sld xmlns:a="http://schemas.openxmlformats.org/drawingml/2006/main" xmlns:r="http://schemas.openxmlformats.org/officeDocument/2006/relationships" xmlns:p="http://schemas.openxmlformats.org/presentationml/2006/main">
+  <p:cSld>
+    <p:spTree>
+      <p:nvGrpSpPr>
+        <p:cNvPr id="1" name=""/>
+        <p:cNvGrpSpPr/>
+        <p:nvPr/>
+      </p:nvGrpSpPr>
+      <p:grpSpPr/>
+      <p:sp>
+        <p:nvSpPr>
+          <p:cNvPr id="2" name="Title 1"/>
+          <p:cNvSpPr>
+            <a:spLocks noGrp="1"/>
+          </p:cNvSpPr>
+          <p:nvPr>
+            <p:ph type="title"/>
+          </p:nvPr>
+        </p:nvSpPr>
+        <p:spPr/>
+        <p:txBody>
+          <a:bodyPr/>
+          <a:p>
+            <a:r>
+              <a:rPr lang="en-US">
+                <a:sym typeface="+mn-ea"/>
+              </a:rPr>
+              <a:t>Spring Framework Beans</a:t>
+            </a:r>
+            <a:br>
+              <a:rPr lang="en-US"/>
+            </a:br>
+            <a:endParaRPr lang="en-US"/>
+          </a:p>
+        </p:txBody>
+      </p:sp>
+      <p:sp>
+        <p:nvSpPr>
+          <p:cNvPr id="3" name="Content Placeholder 2"/>
+          <p:cNvSpPr>
+            <a:spLocks noGrp="1"/>
+          </p:cNvSpPr>
+          <p:nvPr>
+            <p:ph idx="1"/>
+          </p:nvPr>
+        </p:nvSpPr>
+        <p:spPr/>
+        <p:txBody>
+          <a:bodyPr/>
+          <a:p>
+            <a:r>
+              <a:rPr lang="en-US">
+                <a:sym typeface="+mn-ea"/>
+              </a:rPr>
+              <a:t>Bean Factory (app-context.xml)</a:t>
+            </a:r>
+            <a:endParaRPr lang="en-US"/>
+          </a:p>
+          <a:p>
+            <a:endParaRPr lang="en-US"/>
+          </a:p>
+        </p:txBody>
+      </p:sp>
+      <p:sp>
+        <p:nvSpPr>
+          <p:cNvPr id="4" name="Date Placeholder 3"/>
+          <p:cNvSpPr>
+            <a:spLocks noGrp="1"/>
+          </p:cNvSpPr>
+          <p:nvPr>
+            <p:ph type="dt" sz="half" idx="10"/>
+          </p:nvPr>
+        </p:nvSpPr>
+        <p:spPr/>
+        <p:txBody>
+          <a:bodyPr/>
+          <a:p>
+            <a:r>
+              <a:rPr lang="nl-NL" smtClean="0"/>
+              <a:t>31 oktober 2018</a:t>
+            </a:r>
+            <a:endParaRPr lang="nl-NL"/>
+          </a:p>
+        </p:txBody>
+      </p:sp>
+      <p:sp>
+        <p:nvSpPr>
+          <p:cNvPr id="5" name="Footer Placeholder 4"/>
+          <p:cNvSpPr>
+            <a:spLocks noGrp="1"/>
+          </p:cNvSpPr>
+          <p:nvPr>
+            <p:ph type="ftr" sz="quarter" idx="11"/>
+          </p:nvPr>
+        </p:nvSpPr>
+        <p:spPr/>
+        <p:txBody>
+          <a:bodyPr/>
+          <a:p>
+            <a:r>
+              <a:rPr lang="nl-NL" smtClean="0"/>
+              <a:t>Spring Boot</a:t>
+            </a:r>
+            <a:endParaRPr lang="nl-NL"/>
+          </a:p>
+        </p:txBody>
+      </p:sp>
+      <p:sp>
+        <p:nvSpPr>
+          <p:cNvPr id="6" name="Slide Number Placeholder 5"/>
+          <p:cNvSpPr>
+            <a:spLocks noGrp="1"/>
+          </p:cNvSpPr>
+          <p:nvPr>
+            <p:ph type="sldNum" sz="quarter" idx="12"/>
+          </p:nvPr>
+        </p:nvSpPr>
+        <p:spPr/>
+        <p:txBody>
+          <a:bodyPr/>
+          <a:p>
+            <a:fld id="{204CA5A0-4B1D-4A14-8811-788AE825D559}" type="slidenum">
+              <a:rPr lang="nl-NL"/>
+            </a:fld>
+            <a:endParaRPr lang="nl-NL"/>
+          </a:p>
+        </p:txBody>
+      </p:sp>
+      <p:graphicFrame>
+        <p:nvGraphicFramePr>
+          <p:cNvPr id="7" name="Content Placeholder 6"/>
+          <p:cNvGraphicFramePr/>
+          <p:nvPr>
+            <p:ph sz="half" idx="2"/>
+          </p:nvPr>
+        </p:nvGraphicFramePr>
+        <p:xfrm>
+          <a:off x="1332230" y="3353435"/>
+          <a:ext cx="6478905" cy="3296920"/>
+        </p:xfrm>
+        <a:graphic>
+          <a:graphicData uri="http://schemas.openxmlformats.org/presentationml/2006/ole">
+            <mc:AlternateContent xmlns:mc="http://schemas.openxmlformats.org/markup-compatibility/2006">
+              <mc:Choice xmlns:v="urn:schemas-microsoft-com:vml" Requires="v">
+                <p:oleObj spid="_x0000_s8" name="" r:id="rId1" imgW="7162800" imgH="3533775" progId="Paint.Picture">
+                  <p:embed/>
+                </p:oleObj>
+              </mc:Choice>
+              <mc:Fallback>
+                <p:oleObj name="" r:id="rId1" imgW="7162800" imgH="3533775" progId="Paint.Picture">
+                  <p:embed/>
+                  <p:pic>
+                    <p:nvPicPr>
+                      <p:cNvPr id="0" name="Picture 4"/>
+                      <p:cNvPicPr/>
+                      <p:nvPr/>
+                    </p:nvPicPr>
+                    <p:blipFill>
+                      <a:blip r:embed="rId2"/>
+                      <a:stretch>
+                        <a:fillRect/>
+                      </a:stretch>
+                    </p:blipFill>
+                    <p:spPr>
+                      <a:xfrm>
+                        <a:off x="1332230" y="3353435"/>
+                        <a:ext cx="6478905" cy="3296920"/>
+                      </a:xfrm>
+                      <a:prstGeom prst="rect">
+                        <a:avLst/>
+                      </a:prstGeom>
+                    </p:spPr>
+                  </p:pic>
+                </p:oleObj>
+              </mc:Fallback>
+            </mc:AlternateContent>
+          </a:graphicData>
+        </a:graphic>
+      </p:graphicFrame>
+    </p:spTree>
+  </p:cSld>
+  <p:clrMapOvr>
+    <a:masterClrMapping/>
+  </p:clrMapOvr>
+</p:sld>
+</file>
+
+<file path=ppt/slides/slide18.xml><?xml version="1.0" encoding="utf-8"?>
+<p:sld xmlns:a="http://schemas.openxmlformats.org/drawingml/2006/main" xmlns:r="http://schemas.openxmlformats.org/officeDocument/2006/relationships" xmlns:p="http://schemas.openxmlformats.org/presentationml/2006/main">
+  <p:cSld>
+    <p:spTree>
+      <p:nvGrpSpPr>
+        <p:cNvPr id="1" name=""/>
+        <p:cNvGrpSpPr/>
+        <p:nvPr/>
+      </p:nvGrpSpPr>
+      <p:grpSpPr/>
+      <p:sp>
+        <p:nvSpPr>
+          <p:cNvPr id="2" name="Title 1"/>
+          <p:cNvSpPr>
+            <a:spLocks noGrp="1"/>
+          </p:cNvSpPr>
+          <p:nvPr>
+            <p:ph type="title"/>
+          </p:nvPr>
+        </p:nvSpPr>
+        <p:spPr/>
+        <p:txBody>
+          <a:bodyPr/>
+          <a:p>
+            <a:r>
+              <a:rPr lang="en-US">
+                <a:sym typeface="+mn-ea"/>
+              </a:rPr>
+              <a:t>getBean from ApplicationContext</a:t>
+            </a:r>
+            <a:br>
+              <a:rPr lang="en-US"/>
+            </a:br>
+            <a:endParaRPr lang="en-US"/>
+          </a:p>
+        </p:txBody>
+      </p:sp>
+      <p:sp>
+        <p:nvSpPr>
+          <p:cNvPr id="3" name="Content Placeholder 2"/>
+          <p:cNvSpPr>
+            <a:spLocks noGrp="1"/>
+          </p:cNvSpPr>
+          <p:nvPr>
+            <p:ph idx="1"/>
+          </p:nvPr>
+        </p:nvSpPr>
+        <p:spPr>
+          <a:xfrm>
+            <a:off x="683260" y="2987675"/>
+            <a:ext cx="8027035" cy="3548380"/>
+          </a:xfrm>
+        </p:spPr>
+        <p:txBody>
+          <a:bodyPr/>
+          <a:p>
+            <a:pPr marL="0" indent="0">
+              <a:buNone/>
+            </a:pPr>
+            <a:r>
+              <a:rPr lang="en-US">
+                <a:sym typeface="+mn-ea"/>
+              </a:rPr>
+              <a:t>public static void main(String[] args){</a:t>
+            </a:r>
+            <a:endParaRPr lang="en-US"/>
+          </a:p>
+          <a:p>
+            <a:pPr marL="0" indent="0">
+              <a:buNone/>
+            </a:pPr>
+            <a:r>
+              <a:rPr lang="en-US">
+                <a:sym typeface="+mn-ea"/>
+              </a:rPr>
+              <a:t>        BeanFactory context = </a:t>
+            </a:r>
+            <a:br>
+              <a:rPr lang="en-US">
+                <a:sym typeface="+mn-ea"/>
+              </a:rPr>
+            </a:br>
+            <a:r>
+              <a:rPr lang="en-US">
+                <a:sym typeface="+mn-ea"/>
+              </a:rPr>
+              <a:t>	     new ClassPathXmlApplicationContext("beans.xml");</a:t>
+            </a:r>
+            <a:endParaRPr lang="en-US"/>
+          </a:p>
+          <a:p>
+            <a:pPr marL="0" indent="0">
+              <a:buNone/>
+            </a:pPr>
+            <a:r>
+              <a:rPr lang="en-US">
+                <a:sym typeface="+mn-ea"/>
+              </a:rPr>
+              <a:t>        Course course = (Course) context.getBean("Course");</a:t>
+            </a:r>
+            <a:endParaRPr lang="en-US"/>
+          </a:p>
+          <a:p>
+            <a:pPr marL="0" indent="0">
+              <a:buNone/>
+            </a:pPr>
+            <a:r>
+              <a:rPr lang="en-US">
+                <a:sym typeface="+mn-ea"/>
+              </a:rPr>
+              <a:t>    }</a:t>
+            </a:r>
+            <a:endParaRPr lang="en-US"/>
+          </a:p>
+          <a:p>
+            <a:endParaRPr lang="en-US"/>
+          </a:p>
+        </p:txBody>
+      </p:sp>
+      <p:sp>
+        <p:nvSpPr>
+          <p:cNvPr id="4" name="Date Placeholder 3"/>
+          <p:cNvSpPr>
+            <a:spLocks noGrp="1"/>
+          </p:cNvSpPr>
+          <p:nvPr>
+            <p:ph type="dt" sz="half" idx="10"/>
+          </p:nvPr>
+        </p:nvSpPr>
+        <p:spPr/>
+        <p:txBody>
+          <a:bodyPr/>
+          <a:p>
+            <a:r>
+              <a:rPr lang="nl-NL" smtClean="0"/>
+              <a:t>31 oktober 2018</a:t>
+            </a:r>
+            <a:endParaRPr lang="nl-NL"/>
+          </a:p>
+        </p:txBody>
+      </p:sp>
+      <p:sp>
+        <p:nvSpPr>
+          <p:cNvPr id="5" name="Footer Placeholder 4"/>
+          <p:cNvSpPr>
+            <a:spLocks noGrp="1"/>
+          </p:cNvSpPr>
+          <p:nvPr>
+            <p:ph type="ftr" sz="quarter" idx="11"/>
+          </p:nvPr>
+        </p:nvSpPr>
+        <p:spPr/>
+        <p:txBody>
+          <a:bodyPr/>
+          <a:p>
+            <a:r>
+              <a:rPr lang="nl-NL" smtClean="0"/>
+              <a:t>Spring Boot</a:t>
+            </a:r>
+            <a:endParaRPr lang="nl-NL"/>
+          </a:p>
+        </p:txBody>
+      </p:sp>
+      <p:sp>
+        <p:nvSpPr>
+          <p:cNvPr id="6" name="Slide Number Placeholder 5"/>
+          <p:cNvSpPr>
+            <a:spLocks noGrp="1"/>
+          </p:cNvSpPr>
+          <p:nvPr>
+            <p:ph type="sldNum" sz="quarter" idx="12"/>
+          </p:nvPr>
+        </p:nvSpPr>
+        <p:spPr/>
+        <p:txBody>
+          <a:bodyPr/>
+          <a:p>
+            <a:fld id="{204CA5A0-4B1D-4A14-8811-788AE825D559}" type="slidenum">
+              <a:rPr lang="nl-NL"/>
+            </a:fld>
+            <a:endParaRPr lang="nl-NL"/>
+          </a:p>
+        </p:txBody>
+      </p:sp>
+    </p:spTree>
+  </p:cSld>
+  <p:clrMapOvr>
+    <a:masterClrMapping/>
+  </p:clrMapOvr>
+</p:sld>
+</file>
+
+<file path=ppt/slides/slide19.xml><?xml version="1.0" encoding="utf-8"?>
+<p:sld xmlns:a="http://schemas.openxmlformats.org/drawingml/2006/main" xmlns:r="http://schemas.openxmlformats.org/officeDocument/2006/relationships" xmlns:p="http://schemas.openxmlformats.org/presentationml/2006/main">
+  <p:cSld>
+    <p:spTree>
+      <p:nvGrpSpPr>
+        <p:cNvPr id="1" name=""/>
+        <p:cNvGrpSpPr/>
+        <p:nvPr/>
+      </p:nvGrpSpPr>
+      <p:grpSpPr/>
+      <p:sp>
+        <p:nvSpPr>
+          <p:cNvPr id="7" name="Title 6"/>
+          <p:cNvSpPr>
+            <a:spLocks noGrp="1"/>
+          </p:cNvSpPr>
+          <p:nvPr>
+            <p:ph type="title"/>
+          </p:nvPr>
+        </p:nvSpPr>
+        <p:spPr/>
+        <p:txBody>
+          <a:bodyPr/>
+          <a:p>
+            <a:r>
+              <a:rPr lang="en-US">
+                <a:sym typeface="+mn-ea"/>
+              </a:rPr>
+              <a:t>Spring Boot</a:t>
+            </a:r>
+            <a:br>
+              <a:rPr lang="en-US"/>
+            </a:br>
+            <a:endParaRPr lang="en-US"/>
+          </a:p>
+        </p:txBody>
+      </p:sp>
+      <p:sp>
+        <p:nvSpPr>
+          <p:cNvPr id="8" name="Content Placeholder 7"/>
+          <p:cNvSpPr>
+            <a:spLocks noGrp="1"/>
+          </p:cNvSpPr>
+          <p:nvPr>
+            <p:ph sz="half" idx="1"/>
+          </p:nvPr>
+        </p:nvSpPr>
+        <p:spPr>
+          <a:xfrm>
+            <a:off x="734695" y="2987675"/>
+            <a:ext cx="2971800" cy="3548063"/>
+          </a:xfrm>
+        </p:spPr>
+        <p:txBody>
+          <a:bodyPr/>
+          <a:p>
+            <a:pPr marL="0" indent="0">
+              <a:buNone/>
+            </a:pPr>
+            <a:r>
+              <a:rPr lang="en-US">
+                <a:sym typeface="+mn-ea"/>
+              </a:rPr>
+              <a:t>class Laptop</a:t>
+            </a:r>
+            <a:endParaRPr lang="en-US"/>
+          </a:p>
+          <a:p>
+            <a:pPr marL="0" indent="0">
+              <a:buNone/>
+            </a:pPr>
+            <a:r>
+              <a:rPr lang="en-US">
+                <a:sym typeface="+mn-ea"/>
+              </a:rPr>
+              <a:t>{</a:t>
+            </a:r>
+            <a:endParaRPr lang="en-US"/>
+          </a:p>
+          <a:p>
+            <a:pPr marL="0" indent="0">
+              <a:buNone/>
+            </a:pPr>
+            <a:r>
+              <a:rPr lang="en-US">
+                <a:sym typeface="+mn-ea"/>
+              </a:rPr>
+              <a:t>    @Autowired</a:t>
+            </a:r>
+            <a:endParaRPr lang="en-US"/>
+          </a:p>
+          <a:p>
+            <a:pPr marL="0" indent="0">
+              <a:buNone/>
+            </a:pPr>
+            <a:r>
+              <a:rPr lang="en-US">
+                <a:sym typeface="+mn-ea"/>
+              </a:rPr>
+              <a:t>    HardDrive obj1;</a:t>
+            </a:r>
+            <a:endParaRPr lang="en-US"/>
+          </a:p>
+          <a:p>
+            <a:pPr marL="0" indent="0">
+              <a:buNone/>
+            </a:pPr>
+            <a:r>
+              <a:rPr lang="en-US">
+                <a:sym typeface="+mn-ea"/>
+              </a:rPr>
+              <a:t>}</a:t>
+            </a:r>
+            <a:endParaRPr lang="en-US"/>
+          </a:p>
+          <a:p>
+            <a:endParaRPr lang="en-US"/>
+          </a:p>
+        </p:txBody>
+      </p:sp>
+      <p:sp>
+        <p:nvSpPr>
+          <p:cNvPr id="9" name="Content Placeholder 8"/>
+          <p:cNvSpPr>
+            <a:spLocks noGrp="1"/>
+          </p:cNvSpPr>
+          <p:nvPr>
+            <p:ph sz="half" idx="2"/>
+          </p:nvPr>
+        </p:nvSpPr>
+        <p:spPr>
+          <a:xfrm>
+            <a:off x="3515995" y="2987675"/>
+            <a:ext cx="5506085" cy="3548380"/>
+          </a:xfrm>
+        </p:spPr>
+        <p:txBody>
+          <a:bodyPr/>
+          <a:p>
+            <a:pPr marL="0" indent="0">
+              <a:buNone/>
+            </a:pPr>
+            <a:r>
+              <a:rPr lang="en-US">
+                <a:sym typeface="+mn-ea"/>
+              </a:rPr>
+              <a:t>@Component</a:t>
+            </a:r>
+            <a:endParaRPr lang="en-US"/>
+          </a:p>
+          <a:p>
+            <a:pPr marL="0" indent="0">
+              <a:buNone/>
+            </a:pPr>
+            <a:r>
+              <a:rPr lang="en-US">
+                <a:sym typeface="+mn-ea"/>
+              </a:rPr>
+              <a:t>class SamsungHD implements HardDrive</a:t>
+            </a:r>
+            <a:endParaRPr lang="en-US"/>
+          </a:p>
+          <a:p>
+            <a:pPr marL="0" indent="0">
+              <a:buNone/>
+            </a:pPr>
+            <a:r>
+              <a:rPr lang="en-US">
+                <a:sym typeface="+mn-ea"/>
+              </a:rPr>
+              <a:t>{</a:t>
+            </a:r>
+            <a:endParaRPr lang="en-US"/>
+          </a:p>
+          <a:p>
+            <a:pPr marL="0" indent="0">
+              <a:buNone/>
+            </a:pPr>
+            <a:r>
+              <a:rPr lang="en-US">
+                <a:sym typeface="+mn-ea"/>
+              </a:rPr>
+              <a:t>    ...</a:t>
+            </a:r>
+            <a:endParaRPr lang="en-US"/>
+          </a:p>
+          <a:p>
+            <a:pPr marL="0" indent="0">
+              <a:buNone/>
+            </a:pPr>
+            <a:r>
+              <a:rPr lang="en-US">
+                <a:sym typeface="+mn-ea"/>
+              </a:rPr>
+              <a:t>    ...</a:t>
+            </a:r>
+            <a:endParaRPr lang="en-US"/>
+          </a:p>
+          <a:p>
+            <a:pPr marL="0" indent="0">
+              <a:buNone/>
+            </a:pPr>
+            <a:r>
+              <a:rPr lang="en-US">
+                <a:sym typeface="+mn-ea"/>
+              </a:rPr>
+              <a:t>}</a:t>
+            </a:r>
+            <a:endParaRPr lang="en-US"/>
+          </a:p>
+          <a:p>
+            <a:endParaRPr lang="en-US"/>
+          </a:p>
+        </p:txBody>
+      </p:sp>
+      <p:sp>
+        <p:nvSpPr>
+          <p:cNvPr id="4" name="Date Placeholder 3"/>
+          <p:cNvSpPr>
+            <a:spLocks noGrp="1"/>
+          </p:cNvSpPr>
+          <p:nvPr>
+            <p:ph type="dt" sz="half" idx="10"/>
+          </p:nvPr>
+        </p:nvSpPr>
+        <p:spPr/>
+        <p:txBody>
+          <a:bodyPr/>
+          <a:p>
+            <a:r>
+              <a:rPr lang="nl-NL" smtClean="0"/>
+              <a:t>31 oktober 2018</a:t>
+            </a:r>
+            <a:endParaRPr lang="nl-NL"/>
+          </a:p>
+        </p:txBody>
+      </p:sp>
+      <p:sp>
+        <p:nvSpPr>
+          <p:cNvPr id="5" name="Footer Placeholder 4"/>
+          <p:cNvSpPr>
+            <a:spLocks noGrp="1"/>
+          </p:cNvSpPr>
+          <p:nvPr>
+            <p:ph type="ftr" sz="quarter" idx="11"/>
+          </p:nvPr>
+        </p:nvSpPr>
+        <p:spPr/>
+        <p:txBody>
+          <a:bodyPr/>
+          <a:p>
+            <a:r>
+              <a:rPr lang="nl-NL" smtClean="0"/>
+              <a:t>Spring Boot</a:t>
+            </a:r>
+            <a:endParaRPr lang="nl-NL"/>
+          </a:p>
+        </p:txBody>
+      </p:sp>
+      <p:sp>
+        <p:nvSpPr>
+          <p:cNvPr id="6" name="Slide Number Placeholder 5"/>
+          <p:cNvSpPr>
+            <a:spLocks noGrp="1"/>
+          </p:cNvSpPr>
+          <p:nvPr>
+            <p:ph type="sldNum" sz="quarter" idx="12"/>
+          </p:nvPr>
+        </p:nvSpPr>
+        <p:spPr/>
+        <p:txBody>
+          <a:bodyPr/>
+          <a:p>
+            <a:fld id="{204CA5A0-4B1D-4A14-8811-788AE825D559}" type="slidenum">
+              <a:rPr lang="nl-NL"/>
+            </a:fld>
+            <a:endParaRPr lang="nl-NL"/>
+          </a:p>
+        </p:txBody>
+      </p:sp>
+    </p:spTree>
   </p:cSld>
   <p:clrMapOvr>
     <a:masterClrMapping/>
@@ -4378,6 +6468,7 @@
               <a:rPr lang="nl-NL" dirty="0" smtClean="0"/>
               <a:t>Ontstaan in 2012</a:t>
             </a:r>
+            <a:endParaRPr lang="nl-NL" dirty="0" smtClean="0"/>
           </a:p>
           <a:p>
             <a:r>
@@ -4403,6 +6494,7 @@
               <a:rPr lang="nl-NL" dirty="0" smtClean="0"/>
               <a:t>Onderdeel van het grote Spring Framework</a:t>
             </a:r>
+            <a:endParaRPr lang="nl-NL" dirty="0" smtClean="0"/>
           </a:p>
           <a:p>
             <a:r>
@@ -4480,19 +6572,530 @@
           <a:p>
             <a:fld id="{204CA5A0-4B1D-4A14-8811-788AE825D559}" type="slidenum">
               <a:rPr lang="nl-NL" smtClean="0"/>
-              <a:pPr/>
-              <a:t>2</a:t>
             </a:fld>
             <a:endParaRPr lang="nl-NL"/>
           </a:p>
         </p:txBody>
       </p:sp>
     </p:spTree>
-    <p:extLst>
-      <p:ext uri="{BB962C8B-B14F-4D97-AF65-F5344CB8AC3E}">
-        <p14:creationId xmlns:p14="http://schemas.microsoft.com/office/powerpoint/2010/main" val="295116163"/>
-      </p:ext>
-    </p:extLst>
+  </p:cSld>
+  <p:clrMapOvr>
+    <a:masterClrMapping/>
+  </p:clrMapOvr>
+</p:sld>
+</file>
+
+<file path=ppt/slides/slide20.xml><?xml version="1.0" encoding="utf-8"?>
+<p:sld xmlns:a="http://schemas.openxmlformats.org/drawingml/2006/main" xmlns:r="http://schemas.openxmlformats.org/officeDocument/2006/relationships" xmlns:p="http://schemas.openxmlformats.org/presentationml/2006/main">
+  <p:cSld>
+    <p:spTree>
+      <p:nvGrpSpPr>
+        <p:cNvPr id="1" name=""/>
+        <p:cNvGrpSpPr/>
+        <p:nvPr/>
+      </p:nvGrpSpPr>
+      <p:grpSpPr/>
+      <p:sp>
+        <p:nvSpPr>
+          <p:cNvPr id="8" name="Title 7"/>
+          <p:cNvSpPr>
+            <a:spLocks noGrp="1"/>
+          </p:cNvSpPr>
+          <p:nvPr>
+            <p:ph type="title"/>
+          </p:nvPr>
+        </p:nvSpPr>
+        <p:spPr/>
+        <p:txBody>
+          <a:bodyPr/>
+          <a:p>
+            <a:r>
+              <a:rPr lang="en-US">
+                <a:sym typeface="+mn-ea"/>
+              </a:rPr>
+              <a:t>Annotaties Spring Boot</a:t>
+            </a:r>
+            <a:br>
+              <a:rPr lang="en-US"/>
+            </a:br>
+            <a:endParaRPr lang="en-US"/>
+          </a:p>
+        </p:txBody>
+      </p:sp>
+      <p:sp>
+        <p:nvSpPr>
+          <p:cNvPr id="9" name="Content Placeholder 8"/>
+          <p:cNvSpPr>
+            <a:spLocks noGrp="1"/>
+          </p:cNvSpPr>
+          <p:nvPr>
+            <p:ph idx="1"/>
+          </p:nvPr>
+        </p:nvSpPr>
+        <p:spPr>
+          <a:xfrm>
+            <a:off x="1524000" y="2727960"/>
+            <a:ext cx="6096000" cy="3548063"/>
+          </a:xfrm>
+        </p:spPr>
+        <p:txBody>
+          <a:bodyPr/>
+          <a:p>
+            <a:r>
+              <a:rPr lang="en-US" sz="1800">
+                <a:sym typeface="+mn-ea"/>
+              </a:rPr>
+              <a:t>@Autowired</a:t>
+            </a:r>
+            <a:endParaRPr lang="en-US" sz="1800"/>
+          </a:p>
+          <a:p>
+            <a:endParaRPr lang="en-US" sz="1800"/>
+          </a:p>
+          <a:p>
+            <a:r>
+              <a:rPr lang="en-US" sz="1800">
+                <a:sym typeface="+mn-ea"/>
+              </a:rPr>
+              <a:t>@SpringBootApplication</a:t>
+            </a:r>
+            <a:endParaRPr lang="en-US" sz="1800"/>
+          </a:p>
+          <a:p>
+            <a:pPr lvl="1"/>
+            <a:r>
+              <a:rPr lang="en-US" sz="1800">
+                <a:sym typeface="+mn-ea"/>
+              </a:rPr>
+              <a:t>@EnableAutoConfiguration</a:t>
+            </a:r>
+            <a:endParaRPr lang="en-US" sz="1800"/>
+          </a:p>
+          <a:p>
+            <a:pPr lvl="1"/>
+            <a:r>
+              <a:rPr lang="en-US" sz="1800">
+                <a:sym typeface="+mn-ea"/>
+              </a:rPr>
+              <a:t>@ComponentScan</a:t>
+            </a:r>
+            <a:endParaRPr lang="en-US" sz="1800"/>
+          </a:p>
+          <a:p>
+            <a:pPr lvl="1"/>
+            <a:r>
+              <a:rPr lang="en-US" sz="1800">
+                <a:sym typeface="+mn-ea"/>
+              </a:rPr>
+              <a:t>@Configuration</a:t>
+            </a:r>
+            <a:endParaRPr lang="en-US" sz="1800"/>
+          </a:p>
+          <a:p>
+            <a:endParaRPr lang="en-US" sz="1800"/>
+          </a:p>
+          <a:p>
+            <a:r>
+              <a:rPr lang="en-US" sz="1800">
+                <a:sym typeface="+mn-ea"/>
+              </a:rPr>
+              <a:t>@Component</a:t>
+            </a:r>
+            <a:endParaRPr lang="en-US" sz="1800"/>
+          </a:p>
+          <a:p>
+            <a:pPr lvl="1"/>
+            <a:r>
+              <a:rPr lang="en-US" sz="1800">
+                <a:sym typeface="+mn-ea"/>
+              </a:rPr>
+              <a:t>@Service</a:t>
+            </a:r>
+            <a:endParaRPr lang="en-US" sz="1800"/>
+          </a:p>
+          <a:p>
+            <a:pPr lvl="1"/>
+            <a:r>
+              <a:rPr lang="en-US" sz="1800">
+                <a:sym typeface="+mn-ea"/>
+              </a:rPr>
+              <a:t>@Controller</a:t>
+            </a:r>
+            <a:endParaRPr lang="en-US" sz="1800"/>
+          </a:p>
+          <a:p>
+            <a:pPr lvl="1"/>
+            <a:r>
+              <a:rPr lang="en-US" sz="1800">
+                <a:sym typeface="+mn-ea"/>
+              </a:rPr>
+              <a:t>@Repository</a:t>
+            </a:r>
+            <a:endParaRPr lang="en-US" sz="2200"/>
+          </a:p>
+          <a:p>
+            <a:endParaRPr lang="en-US"/>
+          </a:p>
+        </p:txBody>
+      </p:sp>
+      <p:sp>
+        <p:nvSpPr>
+          <p:cNvPr id="5" name="Date Placeholder 4"/>
+          <p:cNvSpPr>
+            <a:spLocks noGrp="1"/>
+          </p:cNvSpPr>
+          <p:nvPr>
+            <p:ph type="dt" sz="half" idx="10"/>
+          </p:nvPr>
+        </p:nvSpPr>
+        <p:spPr/>
+        <p:txBody>
+          <a:bodyPr/>
+          <a:p>
+            <a:r>
+              <a:rPr lang="nl-NL" smtClean="0"/>
+              <a:t>31 oktober 2018</a:t>
+            </a:r>
+            <a:endParaRPr lang="nl-NL"/>
+          </a:p>
+        </p:txBody>
+      </p:sp>
+      <p:sp>
+        <p:nvSpPr>
+          <p:cNvPr id="6" name="Footer Placeholder 5"/>
+          <p:cNvSpPr>
+            <a:spLocks noGrp="1"/>
+          </p:cNvSpPr>
+          <p:nvPr>
+            <p:ph type="ftr" sz="quarter" idx="11"/>
+          </p:nvPr>
+        </p:nvSpPr>
+        <p:spPr/>
+        <p:txBody>
+          <a:bodyPr/>
+          <a:p>
+            <a:r>
+              <a:rPr lang="nl-NL" smtClean="0"/>
+              <a:t>Spring Boot</a:t>
+            </a:r>
+            <a:endParaRPr lang="nl-NL"/>
+          </a:p>
+        </p:txBody>
+      </p:sp>
+      <p:sp>
+        <p:nvSpPr>
+          <p:cNvPr id="7" name="Slide Number Placeholder 6"/>
+          <p:cNvSpPr>
+            <a:spLocks noGrp="1"/>
+          </p:cNvSpPr>
+          <p:nvPr>
+            <p:ph type="sldNum" sz="quarter" idx="12"/>
+          </p:nvPr>
+        </p:nvSpPr>
+        <p:spPr/>
+        <p:txBody>
+          <a:bodyPr/>
+          <a:p>
+            <a:fld id="{88ED7BD2-2969-4CBD-8DB1-AFD361988617}" type="slidenum">
+              <a:rPr lang="nl-NL"/>
+            </a:fld>
+            <a:endParaRPr lang="nl-NL"/>
+          </a:p>
+        </p:txBody>
+      </p:sp>
+    </p:spTree>
+  </p:cSld>
+  <p:clrMapOvr>
+    <a:masterClrMapping/>
+  </p:clrMapOvr>
+</p:sld>
+</file>
+
+<file path=ppt/slides/slide21.xml><?xml version="1.0" encoding="utf-8"?>
+<p:sld xmlns:a="http://schemas.openxmlformats.org/drawingml/2006/main" xmlns:r="http://schemas.openxmlformats.org/officeDocument/2006/relationships" xmlns:p="http://schemas.openxmlformats.org/presentationml/2006/main">
+  <p:cSld>
+    <p:spTree>
+      <p:nvGrpSpPr>
+        <p:cNvPr id="1" name=""/>
+        <p:cNvGrpSpPr/>
+        <p:nvPr/>
+      </p:nvGrpSpPr>
+      <p:grpSpPr/>
+      <p:sp>
+        <p:nvSpPr>
+          <p:cNvPr id="2" name="Title 1"/>
+          <p:cNvSpPr>
+            <a:spLocks noGrp="1"/>
+          </p:cNvSpPr>
+          <p:nvPr>
+            <p:ph type="title"/>
+          </p:nvPr>
+        </p:nvSpPr>
+        <p:spPr/>
+        <p:txBody>
+          <a:bodyPr/>
+          <a:p>
+            <a:r>
+              <a:rPr lang="en-US">
+                <a:sym typeface="+mn-ea"/>
+              </a:rPr>
+              <a:t>3 Manieren van injecteren</a:t>
+            </a:r>
+            <a:br>
+              <a:rPr lang="en-US"/>
+            </a:br>
+            <a:endParaRPr lang="en-US"/>
+          </a:p>
+        </p:txBody>
+      </p:sp>
+      <p:sp>
+        <p:nvSpPr>
+          <p:cNvPr id="3" name="Content Placeholder 2"/>
+          <p:cNvSpPr>
+            <a:spLocks noGrp="1"/>
+          </p:cNvSpPr>
+          <p:nvPr>
+            <p:ph idx="1"/>
+          </p:nvPr>
+        </p:nvSpPr>
+        <p:spPr>
+          <a:xfrm>
+            <a:off x="1524000" y="2576830"/>
+            <a:ext cx="7165975" cy="3548380"/>
+          </a:xfrm>
+        </p:spPr>
+        <p:txBody>
+          <a:bodyPr/>
+          <a:p>
+            <a:r>
+              <a:rPr lang="en-US" sz="1600" b="1">
+                <a:sym typeface="+mn-ea"/>
+              </a:rPr>
+              <a:t>Constructor</a:t>
+            </a:r>
+            <a:endParaRPr lang="en-US" sz="1600"/>
+          </a:p>
+          <a:p>
+            <a:pPr marL="457200" lvl="1" indent="0">
+              <a:buNone/>
+            </a:pPr>
+            <a:r>
+              <a:rPr lang="en-US" sz="1600" i="1">
+                <a:sym typeface="+mn-ea"/>
+              </a:rPr>
+              <a:t>private </a:t>
+            </a:r>
+            <a:r>
+              <a:rPr lang="en-US" sz="1600" b="1" i="1">
+                <a:sym typeface="+mn-ea"/>
+              </a:rPr>
+              <a:t>final </a:t>
+            </a:r>
+            <a:r>
+              <a:rPr lang="en-US" sz="1600" i="1">
+                <a:sym typeface="+mn-ea"/>
+              </a:rPr>
+              <a:t>InjectedBean injectedBean;</a:t>
+            </a:r>
+            <a:endParaRPr lang="en-US" sz="1600" i="1"/>
+          </a:p>
+          <a:p>
+            <a:pPr marL="457200" lvl="1" indent="0">
+              <a:buNone/>
+            </a:pPr>
+            <a:r>
+              <a:rPr lang="en-US" sz="1600" i="1">
+                <a:sym typeface="+mn-ea"/>
+              </a:rPr>
+              <a:t>@Autowired</a:t>
+            </a:r>
+            <a:endParaRPr lang="en-US" sz="1600" i="1"/>
+          </a:p>
+          <a:p>
+            <a:pPr marL="457200" lvl="1" indent="0">
+              <a:buNone/>
+            </a:pPr>
+            <a:r>
+              <a:rPr lang="en-US" sz="1600" i="1">
+                <a:sym typeface="+mn-ea"/>
+              </a:rPr>
+              <a:t>    public ConstructorBasedInjection(InjectedBean injectedBean) {</a:t>
+            </a:r>
+            <a:endParaRPr lang="en-US" sz="1600" i="1"/>
+          </a:p>
+          <a:p>
+            <a:pPr marL="457200" lvl="1" indent="0">
+              <a:buNone/>
+            </a:pPr>
+            <a:r>
+              <a:rPr lang="en-US" sz="1600" i="1">
+                <a:sym typeface="+mn-ea"/>
+              </a:rPr>
+              <a:t>        this.injectedBean = injectedBean;  }</a:t>
+            </a:r>
+            <a:endParaRPr lang="en-US" sz="1600"/>
+          </a:p>
+          <a:p>
+            <a:r>
+              <a:rPr lang="en-US" sz="1600" b="1">
+                <a:sym typeface="+mn-ea"/>
+              </a:rPr>
+              <a:t>Setter</a:t>
+            </a:r>
+            <a:endParaRPr lang="en-US" sz="1600"/>
+          </a:p>
+          <a:p>
+            <a:pPr marL="457200" lvl="1" indent="0">
+              <a:buNone/>
+            </a:pPr>
+            <a:r>
+              <a:rPr lang="en-US" sz="1600" i="1">
+                <a:sym typeface="+mn-ea"/>
+              </a:rPr>
+              <a:t>private InjectedBean injectedBean;</a:t>
+            </a:r>
+            <a:endParaRPr lang="en-US" sz="1600" i="1"/>
+          </a:p>
+          <a:p>
+            <a:pPr marL="457200" lvl="1" indent="0">
+              <a:buNone/>
+            </a:pPr>
+            <a:r>
+              <a:rPr lang="en-US" sz="1600" i="1">
+                <a:sym typeface="+mn-ea"/>
+              </a:rPr>
+              <a:t>@Autowired</a:t>
+            </a:r>
+            <a:endParaRPr lang="en-US" sz="1600" i="1"/>
+          </a:p>
+          <a:p>
+            <a:pPr marL="457200" lvl="1" indent="0">
+              <a:buNone/>
+            </a:pPr>
+            <a:r>
+              <a:rPr lang="en-US" sz="1600" i="1">
+                <a:sym typeface="+mn-ea"/>
+              </a:rPr>
+              <a:t>    public void setInjectedBean(InjectedBean injectedBean) {</a:t>
+            </a:r>
+            <a:endParaRPr lang="en-US" sz="1600" i="1"/>
+          </a:p>
+          <a:p>
+            <a:pPr marL="457200" lvl="1" indent="0">
+              <a:buNone/>
+            </a:pPr>
+            <a:r>
+              <a:rPr lang="en-US" sz="1600" i="1">
+                <a:sym typeface="+mn-ea"/>
+              </a:rPr>
+              <a:t>        this.injectedBean = injectedBean;  }</a:t>
+            </a:r>
+            <a:endParaRPr lang="en-US" sz="1600"/>
+          </a:p>
+          <a:p>
+            <a:r>
+              <a:rPr lang="en-US" sz="1600" b="1">
+                <a:sym typeface="+mn-ea"/>
+              </a:rPr>
+              <a:t>Field</a:t>
+            </a:r>
+            <a:endParaRPr lang="en-US" sz="1600"/>
+          </a:p>
+          <a:p>
+            <a:pPr marL="457200" lvl="1" indent="0">
+              <a:buNone/>
+            </a:pPr>
+            <a:r>
+              <a:rPr lang="en-US" sz="1600" i="1">
+                <a:sym typeface="+mn-ea"/>
+              </a:rPr>
+              <a:t>@Autowired</a:t>
+            </a:r>
+            <a:endParaRPr lang="en-US" sz="1600" i="1"/>
+          </a:p>
+          <a:p>
+            <a:pPr marL="457200" lvl="1" indent="0">
+              <a:buNone/>
+            </a:pPr>
+            <a:r>
+              <a:rPr lang="en-US" sz="1600" i="1">
+                <a:sym typeface="+mn-ea"/>
+              </a:rPr>
+              <a:t>    private InjectedBean injectedBean;</a:t>
+            </a:r>
+            <a:endParaRPr lang="en-US" sz="1600" i="1"/>
+          </a:p>
+          <a:p>
+            <a:endParaRPr lang="en-US" sz="1600" i="1"/>
+          </a:p>
+        </p:txBody>
+      </p:sp>
+      <p:sp>
+        <p:nvSpPr>
+          <p:cNvPr id="4" name="Date Placeholder 3"/>
+          <p:cNvSpPr>
+            <a:spLocks noGrp="1"/>
+          </p:cNvSpPr>
+          <p:nvPr>
+            <p:ph type="dt" sz="half" idx="10"/>
+          </p:nvPr>
+        </p:nvSpPr>
+        <p:spPr/>
+        <p:txBody>
+          <a:bodyPr/>
+          <a:p>
+            <a:r>
+              <a:rPr lang="nl-NL" smtClean="0"/>
+              <a:t>31 oktober 2018</a:t>
+            </a:r>
+            <a:endParaRPr lang="nl-NL"/>
+          </a:p>
+        </p:txBody>
+      </p:sp>
+      <p:sp>
+        <p:nvSpPr>
+          <p:cNvPr id="5" name="Footer Placeholder 4"/>
+          <p:cNvSpPr>
+            <a:spLocks noGrp="1"/>
+          </p:cNvSpPr>
+          <p:nvPr>
+            <p:ph type="ftr" sz="quarter" idx="11"/>
+          </p:nvPr>
+        </p:nvSpPr>
+        <p:spPr/>
+        <p:txBody>
+          <a:bodyPr/>
+          <a:p>
+            <a:r>
+              <a:rPr lang="nl-NL" smtClean="0"/>
+              <a:t>Spring Boot</a:t>
+            </a:r>
+            <a:endParaRPr lang="nl-NL"/>
+          </a:p>
+        </p:txBody>
+      </p:sp>
+      <p:sp>
+        <p:nvSpPr>
+          <p:cNvPr id="6" name="Slide Number Placeholder 5"/>
+          <p:cNvSpPr>
+            <a:spLocks noGrp="1"/>
+          </p:cNvSpPr>
+          <p:nvPr>
+            <p:ph type="sldNum" sz="quarter" idx="12"/>
+          </p:nvPr>
+        </p:nvSpPr>
+        <p:spPr/>
+        <p:txBody>
+          <a:bodyPr/>
+          <a:p>
+            <a:fld id="{204CA5A0-4B1D-4A14-8811-788AE825D559}" type="slidenum">
+              <a:rPr lang="nl-NL"/>
+            </a:fld>
+            <a:endParaRPr lang="nl-NL"/>
+          </a:p>
+        </p:txBody>
+      </p:sp>
+    </p:spTree>
   </p:cSld>
   <p:clrMapOvr>
     <a:masterClrMapping/>
@@ -4640,6 +7243,7 @@
               <a:rPr lang="nl-NL" dirty="0"/>
               <a:t>.</a:t>
             </a:r>
+            <a:endParaRPr lang="nl-NL" dirty="0"/>
           </a:p>
           <a:p>
             <a:pPr marL="0" indent="0">
@@ -4712,19 +7316,12 @@
           <a:p>
             <a:fld id="{204CA5A0-4B1D-4A14-8811-788AE825D559}" type="slidenum">
               <a:rPr lang="nl-NL" smtClean="0"/>
-              <a:pPr/>
-              <a:t>3</a:t>
             </a:fld>
             <a:endParaRPr lang="nl-NL"/>
           </a:p>
         </p:txBody>
       </p:sp>
     </p:spTree>
-    <p:extLst>
-      <p:ext uri="{BB962C8B-B14F-4D97-AF65-F5344CB8AC3E}">
-        <p14:creationId xmlns:p14="http://schemas.microsoft.com/office/powerpoint/2010/main" val="1774575532"/>
-      </p:ext>
-    </p:extLst>
   </p:cSld>
   <p:clrMapOvr>
     <a:masterClrMapping/>
@@ -4794,18 +7391,21 @@
               <a:rPr lang="nl-NL" dirty="0" smtClean="0"/>
               <a:t>Eigenschappen</a:t>
             </a:r>
+            <a:endParaRPr lang="nl-NL" dirty="0" smtClean="0"/>
           </a:p>
           <a:p>
             <a:r>
               <a:rPr lang="nl-NL" dirty="0" smtClean="0"/>
               <a:t>Applicatie Framework</a:t>
             </a:r>
+            <a:endParaRPr lang="nl-NL" dirty="0" smtClean="0"/>
           </a:p>
           <a:p>
             <a:r>
               <a:rPr lang="nl-NL" dirty="0" smtClean="0"/>
               <a:t>Programmeer en Configuratie Model</a:t>
             </a:r>
+            <a:endParaRPr lang="nl-NL" dirty="0" smtClean="0"/>
           </a:p>
           <a:p>
             <a:r>
@@ -4820,6 +7420,7 @@
               <a:rPr lang="nl-NL" dirty="0" smtClean="0"/>
               <a:t>)</a:t>
             </a:r>
+            <a:endParaRPr lang="nl-NL" dirty="0" smtClean="0"/>
           </a:p>
           <a:p>
             <a:pPr marL="0" indent="0">
@@ -4829,6 +7430,7 @@
               <a:rPr lang="nl-NL" dirty="0" smtClean="0"/>
               <a:t>Moeilijkheden</a:t>
             </a:r>
+            <a:endParaRPr lang="nl-NL" dirty="0" smtClean="0"/>
           </a:p>
           <a:p>
             <a:r>
@@ -4846,12 +7448,14 @@
               <a:rPr lang="nl-NL" dirty="0" smtClean="0"/>
               <a:t>Veel verschillende setup stappen</a:t>
             </a:r>
+            <a:endParaRPr lang="nl-NL" dirty="0" smtClean="0"/>
           </a:p>
           <a:p>
             <a:r>
               <a:rPr lang="nl-NL" dirty="0" smtClean="0"/>
               <a:t>Veel configuratie stappen</a:t>
             </a:r>
+            <a:endParaRPr lang="nl-NL" dirty="0" smtClean="0"/>
           </a:p>
           <a:p>
             <a:r>
@@ -4866,6 +7470,7 @@
               <a:rPr lang="nl-NL" dirty="0" smtClean="0"/>
               <a:t> stappen</a:t>
             </a:r>
+            <a:endParaRPr lang="nl-NL" dirty="0" smtClean="0"/>
           </a:p>
           <a:p>
             <a:endParaRPr lang="nl-NL" dirty="0"/>
@@ -4935,19 +7540,12 @@
           <a:p>
             <a:fld id="{204CA5A0-4B1D-4A14-8811-788AE825D559}" type="slidenum">
               <a:rPr lang="nl-NL" smtClean="0"/>
-              <a:pPr/>
-              <a:t>4</a:t>
             </a:fld>
             <a:endParaRPr lang="nl-NL"/>
           </a:p>
         </p:txBody>
       </p:sp>
     </p:spTree>
-    <p:extLst>
-      <p:ext uri="{BB962C8B-B14F-4D97-AF65-F5344CB8AC3E}">
-        <p14:creationId xmlns:p14="http://schemas.microsoft.com/office/powerpoint/2010/main" val="1913776143"/>
-      </p:ext>
-    </p:extLst>
   </p:cSld>
   <p:clrMapOvr>
     <a:masterClrMapping/>
@@ -5042,6 +7640,7 @@
               <a:rPr lang="nl-NL" dirty="0"/>
               <a:t> software componenten te ontwerpen, te bouwen en te testen.</a:t>
             </a:r>
+            <a:endParaRPr lang="nl-NL" dirty="0"/>
           </a:p>
           <a:p>
             <a:r>
@@ -5080,6 +7679,7 @@
               <a:rPr lang="nl-NL" dirty="0"/>
               <a:t> </a:t>
             </a:r>
+            <a:endParaRPr lang="nl-NL" dirty="0"/>
           </a:p>
         </p:txBody>
       </p:sp>
@@ -5146,19 +7746,12 @@
           <a:p>
             <a:fld id="{204CA5A0-4B1D-4A14-8811-788AE825D559}" type="slidenum">
               <a:rPr lang="nl-NL" smtClean="0"/>
-              <a:pPr/>
-              <a:t>5</a:t>
             </a:fld>
             <a:endParaRPr lang="nl-NL"/>
           </a:p>
         </p:txBody>
       </p:sp>
     </p:spTree>
-    <p:extLst>
-      <p:ext uri="{BB962C8B-B14F-4D97-AF65-F5344CB8AC3E}">
-        <p14:creationId xmlns:p14="http://schemas.microsoft.com/office/powerpoint/2010/main" val="2677689293"/>
-      </p:ext>
-    </p:extLst>
   </p:cSld>
   <p:clrMapOvr>
     <a:masterClrMapping/>
@@ -5246,22 +7839,18 @@
               <a:rPr lang="nl-NL" dirty="0" smtClean="0"/>
               <a:t>:</a:t>
             </a:r>
-            <a:r>
-              <a:rPr lang="nl-NL" dirty="0"/>
-              <a:t/>
-            </a:r>
             <a:br>
               <a:rPr lang="nl-NL" dirty="0"/>
             </a:br>
             <a:r>
               <a:rPr lang="nl-NL" dirty="0">
-                <a:hlinkClick r:id="rId2"/>
+                <a:hlinkClick r:id="rId1"/>
               </a:rPr>
               <a:t>https://</a:t>
             </a:r>
             <a:r>
               <a:rPr lang="nl-NL" dirty="0" smtClean="0">
-                <a:hlinkClick r:id="rId2"/>
+                <a:hlinkClick r:id="rId1"/>
               </a:rPr>
               <a:t>jira.spring.io/browse/SPR-9888</a:t>
             </a:r>
@@ -5280,6 +7869,7 @@
               <a:rPr lang="nl-NL" dirty="0" smtClean="0"/>
               <a:t>april 2014 werd Spring Boot 1.0.0 vrijgegeven.</a:t>
             </a:r>
+            <a:endParaRPr lang="nl-NL" dirty="0" smtClean="0"/>
           </a:p>
           <a:p>
             <a:r>
@@ -5326,6 +7916,7 @@
               <a:rPr lang="nl-NL" dirty="0" smtClean="0"/>
               <a:t>.</a:t>
             </a:r>
+            <a:endParaRPr lang="nl-NL" dirty="0" smtClean="0"/>
           </a:p>
           <a:p>
             <a:r>
@@ -5348,6 +7939,7 @@
               <a:rPr lang="nl-NL" dirty="0" smtClean="0"/>
               <a:t>&amp; prototyping</a:t>
             </a:r>
+            <a:endParaRPr lang="nl-NL" dirty="0" smtClean="0"/>
           </a:p>
           <a:p>
             <a:endParaRPr lang="nl-NL" dirty="0"/>
@@ -5417,19 +8009,12 @@
           <a:p>
             <a:fld id="{204CA5A0-4B1D-4A14-8811-788AE825D559}" type="slidenum">
               <a:rPr lang="nl-NL" smtClean="0"/>
-              <a:pPr/>
-              <a:t>6</a:t>
             </a:fld>
             <a:endParaRPr lang="nl-NL"/>
           </a:p>
         </p:txBody>
       </p:sp>
     </p:spTree>
-    <p:extLst>
-      <p:ext uri="{BB962C8B-B14F-4D97-AF65-F5344CB8AC3E}">
-        <p14:creationId xmlns:p14="http://schemas.microsoft.com/office/powerpoint/2010/main" val="2221501375"/>
-      </p:ext>
-    </p:extLst>
   </p:cSld>
   <p:clrMapOvr>
     <a:masterClrMapping/>
@@ -5517,8 +8102,6 @@
           <a:p>
             <a:fld id="{7D42650C-8C65-4F3F-AFCB-9DFD34A689A0}" type="slidenum">
               <a:rPr lang="nl-NL" smtClean="0"/>
-              <a:pPr/>
-              <a:t>7</a:t>
             </a:fld>
             <a:endParaRPr lang="nl-NL"/>
           </a:p>
@@ -5533,7 +8116,7 @@
           <p:nvPr/>
         </p:nvPicPr>
         <p:blipFill>
-          <a:blip r:embed="rId2"/>
+          <a:blip r:embed="rId1"/>
           <a:stretch>
             <a:fillRect/>
           </a:stretch>
@@ -5549,11 +8132,6 @@
         </p:spPr>
       </p:pic>
     </p:spTree>
-    <p:extLst>
-      <p:ext uri="{BB962C8B-B14F-4D97-AF65-F5344CB8AC3E}">
-        <p14:creationId xmlns:p14="http://schemas.microsoft.com/office/powerpoint/2010/main" val="168345753"/>
-      </p:ext>
-    </p:extLst>
   </p:cSld>
   <p:clrMapOvr>
     <a:masterClrMapping/>
@@ -5931,10 +8509,11 @@
               <a:rPr lang="nl-NL" dirty="0"/>
               <a:t>.</a:t>
             </a:r>
-          </a:p>
-          <a:p>
             <a:endParaRPr lang="nl-NL" dirty="0"/>
           </a:p>
+          <a:p>
+            <a:endParaRPr lang="nl-NL" dirty="0"/>
+          </a:p>
         </p:txBody>
       </p:sp>
       <p:sp>
@@ -6000,19 +8579,12 @@
           <a:p>
             <a:fld id="{204CA5A0-4B1D-4A14-8811-788AE825D559}" type="slidenum">
               <a:rPr lang="nl-NL" smtClean="0"/>
-              <a:pPr/>
-              <a:t>8</a:t>
             </a:fld>
             <a:endParaRPr lang="nl-NL"/>
           </a:p>
         </p:txBody>
       </p:sp>
     </p:spTree>
-    <p:extLst>
-      <p:ext uri="{BB962C8B-B14F-4D97-AF65-F5344CB8AC3E}">
-        <p14:creationId xmlns:p14="http://schemas.microsoft.com/office/powerpoint/2010/main" val="1814199761"/>
-      </p:ext>
-    </p:extLst>
   </p:cSld>
   <p:clrMapOvr>
     <a:masterClrMapping/>
@@ -6100,8 +8672,6 @@
           <a:p>
             <a:fld id="{7D42650C-8C65-4F3F-AFCB-9DFD34A689A0}" type="slidenum">
               <a:rPr lang="nl-NL" smtClean="0"/>
-              <a:pPr/>
-              <a:t>9</a:t>
             </a:fld>
             <a:endParaRPr lang="nl-NL"/>
           </a:p>
@@ -6116,7 +8686,7 @@
           <p:nvPr/>
         </p:nvPicPr>
         <p:blipFill>
-          <a:blip r:embed="rId2"/>
+          <a:blip r:embed="rId1"/>
           <a:stretch>
             <a:fillRect/>
           </a:stretch>
@@ -6132,31 +8702,11 @@
         </p:spPr>
       </p:pic>
     </p:spTree>
-    <p:extLst>
-      <p:ext uri="{BB962C8B-B14F-4D97-AF65-F5344CB8AC3E}">
-        <p14:creationId xmlns:p14="http://schemas.microsoft.com/office/powerpoint/2010/main" val="4113198046"/>
-      </p:ext>
-    </p:extLst>
   </p:cSld>
   <p:clrMapOvr>
     <a:masterClrMapping/>
   </p:clrMapOvr>
 </p:sld>
-</file>
-
-<file path=ppt/tags/tag1.xml><?xml version="1.0" encoding="utf-8"?>
-<p:tagLst xmlns:a="http://schemas.openxmlformats.org/drawingml/2006/main" xmlns:r="http://schemas.openxmlformats.org/officeDocument/2006/relationships" xmlns:p="http://schemas.openxmlformats.org/presentationml/2006/main">
-  <p:tag name="PVSYSTEMID" val="{1AB53534-61E9-4B94-8B2B-487D995ECC50}"/>
-  <p:tag name="PVLCID" val="1043"/>
-  <p:tag name="PVDATE" val="31 &lt;Month10&gt; 2018"/>
-  <p:tag name="PVINSERTDATE" val="Yes"/>
-  <p:tag name="PVINSERTSLIDENUMBER" val="Yes"/>
-  <p:tag name="PVLOGOID" val="0"/>
-  <p:tag name="PVLOGOVERSION" val="1"/>
-  <p:tag name="PVTITLEOTHERPAGES" val="Spring Boot"/>
-  <p:tag name="PVTEMPLATE" val="Plato"/>
-  <p:tag name="PVTEMPLATEVERSION" val="2"/>
-</p:tagLst>
 </file>
 
 <file path=ppt/theme/theme1.xml><?xml version="1.0" encoding="utf-8"?>
@@ -6350,7 +8900,6 @@
       </a:bgFillStyleLst>
     </a:fmtScheme>
   </a:themeElements>
-  <a:objectDefaults/>
   <a:extraClrSchemeLst>
     <a:extraClrScheme>
       <a:clrScheme name="Standaardontwerp 1">
@@ -6396,7 +8945,7 @@
   </a:extraClrSchemeLst>
   <a:extLst>
     <a:ext uri="{05A4C25C-085E-4340-85A3-A5531E510DB2}">
-      <thm15:themeFamily xmlns:thm15="http://schemas.microsoft.com/office/thememl/2012/main" name="Plato.potx" id="{6C146796-4991-4798-97BD-3B32C6952F37}" vid="{1CB34CED-D2D7-48CB-9928-0F686C70BD83}"/>
+      <thm15:themeFamily xmlns:thm15="http://schemas.microsoft.com/office/thememl/2012/main" name="Office Theme" id="{62F939B6-93AF-4DB8-9C6B-D6C7DFDC589F}" vid="{4A3C46E8-61CC-4603-A589-7422A47A8E4A}"/>
     </a:ext>
   </a:extLst>
 </a:theme>
@@ -6445,7 +8994,7 @@
     </a:clrScheme>
     <a:fontScheme name="Office">
       <a:majorFont>
-        <a:latin typeface="Calibri Light" panose="020F0302020204030204"/>
+        <a:latin typeface="Calibri Light"/>
         <a:ea typeface=""/>
         <a:cs typeface=""/>
         <a:font script="Jpan" typeface="ＭＳ Ｐゴシック"/>
@@ -6480,7 +9029,7 @@
         <a:font script="Geor" typeface="Sylfaen"/>
       </a:majorFont>
       <a:minorFont>
-        <a:latin typeface="Calibri" panose="020F0502020204030204"/>
+        <a:latin typeface="Calibri"/>
         <a:ea typeface=""/>
         <a:cs typeface=""/>
         <a:font script="Jpan" typeface="ＭＳ Ｐゴシック"/>
@@ -6653,8 +9202,6 @@
       </a:bgFillStyleLst>
     </a:fmtScheme>
   </a:themeElements>
-  <a:objectDefaults/>
-  <a:extraClrSchemeLst/>
   <a:extLst>
     <a:ext uri="{05A4C25C-085E-4340-85A3-A5531E510DB2}">
       <thm15:themeFamily xmlns:thm15="http://schemas.microsoft.com/office/thememl/2012/main" name="Office Theme" id="{62F939B6-93AF-4DB8-9C6B-D6C7DFDC589F}" vid="{4A3C46E8-61CC-4603-A589-7422A47A8E4A}"/>
@@ -6706,7 +9253,7 @@
     </a:clrScheme>
     <a:fontScheme name="Office">
       <a:majorFont>
-        <a:latin typeface="Calibri Light" panose="020F0302020204030204"/>
+        <a:latin typeface="Calibri Light"/>
         <a:ea typeface=""/>
         <a:cs typeface=""/>
         <a:font script="Jpan" typeface="ＭＳ Ｐゴシック"/>
@@ -6741,7 +9288,7 @@
         <a:font script="Geor" typeface="Sylfaen"/>
       </a:majorFont>
       <a:minorFont>
-        <a:latin typeface="Calibri" panose="020F0502020204030204"/>
+        <a:latin typeface="Calibri"/>
         <a:ea typeface=""/>
         <a:cs typeface=""/>
         <a:font script="Jpan" typeface="ＭＳ Ｐゴシック"/>
@@ -6914,8 +9461,6 @@
       </a:bgFillStyleLst>
     </a:fmtScheme>
   </a:themeElements>
-  <a:objectDefaults/>
-  <a:extraClrSchemeLst/>
   <a:extLst>
     <a:ext uri="{05A4C25C-085E-4340-85A3-A5531E510DB2}">
       <thm15:themeFamily xmlns:thm15="http://schemas.microsoft.com/office/thememl/2012/main" name="Office Theme" id="{62F939B6-93AF-4DB8-9C6B-D6C7DFDC589F}" vid="{4A3C46E8-61CC-4603-A589-7422A47A8E4A}"/>

</xml_diff>